<commit_message>
update readme & youtube links
</commit_message>
<xml_diff>
--- a/RemoteDoorControl/doc/RDC_Präsentation.pptx
+++ b/RemoteDoorControl/doc/RDC_Präsentation.pptx
@@ -4,15 +4,16 @@
   <p:sldMasterIdLst>
     <p:sldMasterId id="2147483648" r:id="rId4"/>
   </p:sldMasterIdLst>
+  <p:notesMasterIdLst>
+    <p:notesMasterId r:id="rId11"/>
+  </p:notesMasterIdLst>
   <p:sldIdLst>
     <p:sldId id="256" r:id="rId5"/>
     <p:sldId id="257" r:id="rId6"/>
-    <p:sldId id="263" r:id="rId7"/>
-    <p:sldId id="258" r:id="rId8"/>
-    <p:sldId id="262" r:id="rId9"/>
-    <p:sldId id="259" r:id="rId10"/>
-    <p:sldId id="260" r:id="rId11"/>
-    <p:sldId id="261" r:id="rId12"/>
+    <p:sldId id="258" r:id="rId7"/>
+    <p:sldId id="259" r:id="rId8"/>
+    <p:sldId id="260" r:id="rId9"/>
+    <p:sldId id="261" r:id="rId10"/>
   </p:sldIdLst>
   <p:sldSz cx="12192000" cy="6858000"/>
   <p:notesSz cx="6858000" cy="9144000"/>
@@ -111,6 +112,11 @@
       </a:defRPr>
     </a:lvl9pPr>
   </p:defaultTextStyle>
+  <p:extLst>
+    <p:ext uri="{EFAFB233-063F-42B5-8137-9DF3F51BA10A}">
+      <p15:sldGuideLst xmlns:p15="http://schemas.microsoft.com/office/powerpoint/2012/main"/>
+    </p:ext>
+  </p:extLst>
 </p:presentation>
 </file>
 
@@ -123,6 +129,577 @@
     <p1510:client id="{E2C7DF49-7408-4890-888C-298A17CF4C4A}" v="21" dt="2022-01-14T10:25:40.306"/>
   </p1510:revLst>
 </p1510:revInfo>
+</file>
+
+<file path=ppt/notesMasters/notesMaster1.xml><?xml version="1.0" encoding="utf-8"?>
+<p:notesMaster xmlns:a="http://schemas.openxmlformats.org/drawingml/2006/main" xmlns:r="http://schemas.openxmlformats.org/officeDocument/2006/relationships" xmlns:p="http://schemas.openxmlformats.org/presentationml/2006/main">
+  <p:cSld>
+    <p:bg>
+      <p:bgRef idx="1001">
+        <a:schemeClr val="bg1"/>
+      </p:bgRef>
+    </p:bg>
+    <p:spTree>
+      <p:nvGrpSpPr>
+        <p:cNvPr id="1" name=""/>
+        <p:cNvGrpSpPr/>
+        <p:nvPr/>
+      </p:nvGrpSpPr>
+      <p:grpSpPr>
+        <a:xfrm>
+          <a:off x="0" y="0"/>
+          <a:ext cx="0" cy="0"/>
+          <a:chOff x="0" y="0"/>
+          <a:chExt cx="0" cy="0"/>
+        </a:xfrm>
+      </p:grpSpPr>
+      <p:sp>
+        <p:nvSpPr>
+          <p:cNvPr id="2" name="Kopfzeilenplatzhalter 1"/>
+          <p:cNvSpPr>
+            <a:spLocks noGrp="1"/>
+          </p:cNvSpPr>
+          <p:nvPr>
+            <p:ph type="hdr" sz="quarter"/>
+          </p:nvPr>
+        </p:nvSpPr>
+        <p:spPr>
+          <a:xfrm>
+            <a:off x="0" y="0"/>
+            <a:ext cx="2971800" cy="458788"/>
+          </a:xfrm>
+          <a:prstGeom prst="rect">
+            <a:avLst/>
+          </a:prstGeom>
+        </p:spPr>
+        <p:txBody>
+          <a:bodyPr vert="horz" lIns="91440" tIns="45720" rIns="91440" bIns="45720" rtlCol="0"/>
+          <a:lstStyle>
+            <a:lvl1pPr algn="l">
+              <a:defRPr sz="1200"/>
+            </a:lvl1pPr>
+          </a:lstStyle>
+          <a:p>
+            <a:endParaRPr lang="en-GB"/>
+          </a:p>
+        </p:txBody>
+      </p:sp>
+      <p:sp>
+        <p:nvSpPr>
+          <p:cNvPr id="3" name="Datumsplatzhalter 2"/>
+          <p:cNvSpPr>
+            <a:spLocks noGrp="1"/>
+          </p:cNvSpPr>
+          <p:nvPr>
+            <p:ph type="dt" idx="1"/>
+          </p:nvPr>
+        </p:nvSpPr>
+        <p:spPr>
+          <a:xfrm>
+            <a:off x="3884613" y="0"/>
+            <a:ext cx="2971800" cy="458788"/>
+          </a:xfrm>
+          <a:prstGeom prst="rect">
+            <a:avLst/>
+          </a:prstGeom>
+        </p:spPr>
+        <p:txBody>
+          <a:bodyPr vert="horz" lIns="91440" tIns="45720" rIns="91440" bIns="45720" rtlCol="0"/>
+          <a:lstStyle>
+            <a:lvl1pPr algn="r">
+              <a:defRPr sz="1200"/>
+            </a:lvl1pPr>
+          </a:lstStyle>
+          <a:p>
+            <a:fld id="{7043DBC9-B530-4246-98E0-B6B0E7EBD7CB}" type="datetimeFigureOut">
+              <a:rPr lang="en-GB" smtClean="0"/>
+              <a:t>16/01/2022</a:t>
+            </a:fld>
+            <a:endParaRPr lang="en-GB"/>
+          </a:p>
+        </p:txBody>
+      </p:sp>
+      <p:sp>
+        <p:nvSpPr>
+          <p:cNvPr id="4" name="Folienbildplatzhalter 3"/>
+          <p:cNvSpPr>
+            <a:spLocks noGrp="1" noRot="1" noChangeAspect="1"/>
+          </p:cNvSpPr>
+          <p:nvPr>
+            <p:ph type="sldImg" idx="2"/>
+          </p:nvPr>
+        </p:nvSpPr>
+        <p:spPr>
+          <a:xfrm>
+            <a:off x="685800" y="1143000"/>
+            <a:ext cx="5486400" cy="3086100"/>
+          </a:xfrm>
+          <a:prstGeom prst="rect">
+            <a:avLst/>
+          </a:prstGeom>
+          <a:noFill/>
+          <a:ln w="12700">
+            <a:solidFill>
+              <a:prstClr val="black"/>
+            </a:solidFill>
+          </a:ln>
+        </p:spPr>
+        <p:txBody>
+          <a:bodyPr vert="horz" lIns="91440" tIns="45720" rIns="91440" bIns="45720" rtlCol="0" anchor="ctr"/>
+          <a:lstStyle/>
+          <a:p>
+            <a:endParaRPr lang="en-GB"/>
+          </a:p>
+        </p:txBody>
+      </p:sp>
+      <p:sp>
+        <p:nvSpPr>
+          <p:cNvPr id="5" name="Notizenplatzhalter 4"/>
+          <p:cNvSpPr>
+            <a:spLocks noGrp="1"/>
+          </p:cNvSpPr>
+          <p:nvPr>
+            <p:ph type="body" sz="quarter" idx="3"/>
+          </p:nvPr>
+        </p:nvSpPr>
+        <p:spPr>
+          <a:xfrm>
+            <a:off x="685800" y="4400550"/>
+            <a:ext cx="5486400" cy="3600450"/>
+          </a:xfrm>
+          <a:prstGeom prst="rect">
+            <a:avLst/>
+          </a:prstGeom>
+        </p:spPr>
+        <p:txBody>
+          <a:bodyPr vert="horz" lIns="91440" tIns="45720" rIns="91440" bIns="45720" rtlCol="0"/>
+          <a:lstStyle/>
+          <a:p>
+            <a:pPr lvl="0"/>
+            <a:r>
+              <a:rPr lang="de-DE"/>
+              <a:t>Mastertextformat bearbeiten</a:t>
+            </a:r>
+          </a:p>
+          <a:p>
+            <a:pPr lvl="1"/>
+            <a:r>
+              <a:rPr lang="de-DE"/>
+              <a:t>Zweite Ebene</a:t>
+            </a:r>
+          </a:p>
+          <a:p>
+            <a:pPr lvl="2"/>
+            <a:r>
+              <a:rPr lang="de-DE"/>
+              <a:t>Dritte Ebene</a:t>
+            </a:r>
+          </a:p>
+          <a:p>
+            <a:pPr lvl="3"/>
+            <a:r>
+              <a:rPr lang="de-DE"/>
+              <a:t>Vierte Ebene</a:t>
+            </a:r>
+          </a:p>
+          <a:p>
+            <a:pPr lvl="4"/>
+            <a:r>
+              <a:rPr lang="de-DE"/>
+              <a:t>Fünfte Ebene</a:t>
+            </a:r>
+            <a:endParaRPr lang="en-GB"/>
+          </a:p>
+        </p:txBody>
+      </p:sp>
+      <p:sp>
+        <p:nvSpPr>
+          <p:cNvPr id="6" name="Fußzeilenplatzhalter 5"/>
+          <p:cNvSpPr>
+            <a:spLocks noGrp="1"/>
+          </p:cNvSpPr>
+          <p:nvPr>
+            <p:ph type="ftr" sz="quarter" idx="4"/>
+          </p:nvPr>
+        </p:nvSpPr>
+        <p:spPr>
+          <a:xfrm>
+            <a:off x="0" y="8685213"/>
+            <a:ext cx="2971800" cy="458787"/>
+          </a:xfrm>
+          <a:prstGeom prst="rect">
+            <a:avLst/>
+          </a:prstGeom>
+        </p:spPr>
+        <p:txBody>
+          <a:bodyPr vert="horz" lIns="91440" tIns="45720" rIns="91440" bIns="45720" rtlCol="0" anchor="b"/>
+          <a:lstStyle>
+            <a:lvl1pPr algn="l">
+              <a:defRPr sz="1200"/>
+            </a:lvl1pPr>
+          </a:lstStyle>
+          <a:p>
+            <a:endParaRPr lang="en-GB"/>
+          </a:p>
+        </p:txBody>
+      </p:sp>
+      <p:sp>
+        <p:nvSpPr>
+          <p:cNvPr id="7" name="Foliennummernplatzhalter 6"/>
+          <p:cNvSpPr>
+            <a:spLocks noGrp="1"/>
+          </p:cNvSpPr>
+          <p:nvPr>
+            <p:ph type="sldNum" sz="quarter" idx="5"/>
+          </p:nvPr>
+        </p:nvSpPr>
+        <p:spPr>
+          <a:xfrm>
+            <a:off x="3884613" y="8685213"/>
+            <a:ext cx="2971800" cy="458787"/>
+          </a:xfrm>
+          <a:prstGeom prst="rect">
+            <a:avLst/>
+          </a:prstGeom>
+        </p:spPr>
+        <p:txBody>
+          <a:bodyPr vert="horz" lIns="91440" tIns="45720" rIns="91440" bIns="45720" rtlCol="0" anchor="b"/>
+          <a:lstStyle>
+            <a:lvl1pPr algn="r">
+              <a:defRPr sz="1200"/>
+            </a:lvl1pPr>
+          </a:lstStyle>
+          <a:p>
+            <a:fld id="{003CA7F2-EEDD-4E62-9655-47418E641ACB}" type="slidenum">
+              <a:rPr lang="en-GB" smtClean="0"/>
+              <a:t>‹Nr.›</a:t>
+            </a:fld>
+            <a:endParaRPr lang="en-GB"/>
+          </a:p>
+        </p:txBody>
+      </p:sp>
+    </p:spTree>
+    <p:extLst>
+      <p:ext uri="{BB962C8B-B14F-4D97-AF65-F5344CB8AC3E}">
+        <p14:creationId xmlns:p14="http://schemas.microsoft.com/office/powerpoint/2010/main" val="1811919633"/>
+      </p:ext>
+    </p:extLst>
+  </p:cSld>
+  <p:clrMap bg1="lt1" tx1="dk1" bg2="lt2" tx2="dk2" accent1="accent1" accent2="accent2" accent3="accent3" accent4="accent4" accent5="accent5" accent6="accent6" hlink="hlink" folHlink="folHlink"/>
+  <p:notesStyle>
+    <a:lvl1pPr marL="0" algn="l" defTabSz="914400" rtl="0" eaLnBrk="1" latinLnBrk="0" hangingPunct="1">
+      <a:defRPr sz="1200" kern="1200">
+        <a:solidFill>
+          <a:schemeClr val="tx1"/>
+        </a:solidFill>
+        <a:latin typeface="+mn-lt"/>
+        <a:ea typeface="+mn-ea"/>
+        <a:cs typeface="+mn-cs"/>
+      </a:defRPr>
+    </a:lvl1pPr>
+    <a:lvl2pPr marL="457200" algn="l" defTabSz="914400" rtl="0" eaLnBrk="1" latinLnBrk="0" hangingPunct="1">
+      <a:defRPr sz="1200" kern="1200">
+        <a:solidFill>
+          <a:schemeClr val="tx1"/>
+        </a:solidFill>
+        <a:latin typeface="+mn-lt"/>
+        <a:ea typeface="+mn-ea"/>
+        <a:cs typeface="+mn-cs"/>
+      </a:defRPr>
+    </a:lvl2pPr>
+    <a:lvl3pPr marL="914400" algn="l" defTabSz="914400" rtl="0" eaLnBrk="1" latinLnBrk="0" hangingPunct="1">
+      <a:defRPr sz="1200" kern="1200">
+        <a:solidFill>
+          <a:schemeClr val="tx1"/>
+        </a:solidFill>
+        <a:latin typeface="+mn-lt"/>
+        <a:ea typeface="+mn-ea"/>
+        <a:cs typeface="+mn-cs"/>
+      </a:defRPr>
+    </a:lvl3pPr>
+    <a:lvl4pPr marL="1371600" algn="l" defTabSz="914400" rtl="0" eaLnBrk="1" latinLnBrk="0" hangingPunct="1">
+      <a:defRPr sz="1200" kern="1200">
+        <a:solidFill>
+          <a:schemeClr val="tx1"/>
+        </a:solidFill>
+        <a:latin typeface="+mn-lt"/>
+        <a:ea typeface="+mn-ea"/>
+        <a:cs typeface="+mn-cs"/>
+      </a:defRPr>
+    </a:lvl4pPr>
+    <a:lvl5pPr marL="1828800" algn="l" defTabSz="914400" rtl="0" eaLnBrk="1" latinLnBrk="0" hangingPunct="1">
+      <a:defRPr sz="1200" kern="1200">
+        <a:solidFill>
+          <a:schemeClr val="tx1"/>
+        </a:solidFill>
+        <a:latin typeface="+mn-lt"/>
+        <a:ea typeface="+mn-ea"/>
+        <a:cs typeface="+mn-cs"/>
+      </a:defRPr>
+    </a:lvl5pPr>
+    <a:lvl6pPr marL="2286000" algn="l" defTabSz="914400" rtl="0" eaLnBrk="1" latinLnBrk="0" hangingPunct="1">
+      <a:defRPr sz="1200" kern="1200">
+        <a:solidFill>
+          <a:schemeClr val="tx1"/>
+        </a:solidFill>
+        <a:latin typeface="+mn-lt"/>
+        <a:ea typeface="+mn-ea"/>
+        <a:cs typeface="+mn-cs"/>
+      </a:defRPr>
+    </a:lvl6pPr>
+    <a:lvl7pPr marL="2743200" algn="l" defTabSz="914400" rtl="0" eaLnBrk="1" latinLnBrk="0" hangingPunct="1">
+      <a:defRPr sz="1200" kern="1200">
+        <a:solidFill>
+          <a:schemeClr val="tx1"/>
+        </a:solidFill>
+        <a:latin typeface="+mn-lt"/>
+        <a:ea typeface="+mn-ea"/>
+        <a:cs typeface="+mn-cs"/>
+      </a:defRPr>
+    </a:lvl7pPr>
+    <a:lvl8pPr marL="3200400" algn="l" defTabSz="914400" rtl="0" eaLnBrk="1" latinLnBrk="0" hangingPunct="1">
+      <a:defRPr sz="1200" kern="1200">
+        <a:solidFill>
+          <a:schemeClr val="tx1"/>
+        </a:solidFill>
+        <a:latin typeface="+mn-lt"/>
+        <a:ea typeface="+mn-ea"/>
+        <a:cs typeface="+mn-cs"/>
+      </a:defRPr>
+    </a:lvl8pPr>
+    <a:lvl9pPr marL="3657600" algn="l" defTabSz="914400" rtl="0" eaLnBrk="1" latinLnBrk="0" hangingPunct="1">
+      <a:defRPr sz="1200" kern="1200">
+        <a:solidFill>
+          <a:schemeClr val="tx1"/>
+        </a:solidFill>
+        <a:latin typeface="+mn-lt"/>
+        <a:ea typeface="+mn-ea"/>
+        <a:cs typeface="+mn-cs"/>
+      </a:defRPr>
+    </a:lvl9pPr>
+  </p:notesStyle>
+</p:notesMaster>
+</file>
+
+<file path=ppt/notesSlides/notesSlide1.xml><?xml version="1.0" encoding="utf-8"?>
+<p:notes xmlns:a="http://schemas.openxmlformats.org/drawingml/2006/main" xmlns:r="http://schemas.openxmlformats.org/officeDocument/2006/relationships" xmlns:p="http://schemas.openxmlformats.org/presentationml/2006/main">
+  <p:cSld>
+    <p:spTree>
+      <p:nvGrpSpPr>
+        <p:cNvPr id="1" name=""/>
+        <p:cNvGrpSpPr/>
+        <p:nvPr/>
+      </p:nvGrpSpPr>
+      <p:grpSpPr>
+        <a:xfrm>
+          <a:off x="0" y="0"/>
+          <a:ext cx="0" cy="0"/>
+          <a:chOff x="0" y="0"/>
+          <a:chExt cx="0" cy="0"/>
+        </a:xfrm>
+      </p:grpSpPr>
+      <p:sp>
+        <p:nvSpPr>
+          <p:cNvPr id="2" name="Folienbildplatzhalter 1"/>
+          <p:cNvSpPr>
+            <a:spLocks noGrp="1" noRot="1" noChangeAspect="1"/>
+          </p:cNvSpPr>
+          <p:nvPr>
+            <p:ph type="sldImg"/>
+          </p:nvPr>
+        </p:nvSpPr>
+        <p:spPr/>
+      </p:sp>
+      <p:sp>
+        <p:nvSpPr>
+          <p:cNvPr id="3" name="Notizenplatzhalter 2"/>
+          <p:cNvSpPr>
+            <a:spLocks noGrp="1"/>
+          </p:cNvSpPr>
+          <p:nvPr>
+            <p:ph type="body" idx="1"/>
+          </p:nvPr>
+        </p:nvSpPr>
+        <p:spPr/>
+        <p:txBody>
+          <a:bodyPr/>
+          <a:lstStyle/>
+          <a:p>
+            <a:endParaRPr lang="en-GB" dirty="0"/>
+          </a:p>
+        </p:txBody>
+      </p:sp>
+      <p:sp>
+        <p:nvSpPr>
+          <p:cNvPr id="4" name="Foliennummernplatzhalter 3"/>
+          <p:cNvSpPr>
+            <a:spLocks noGrp="1"/>
+          </p:cNvSpPr>
+          <p:nvPr>
+            <p:ph type="sldNum" sz="quarter" idx="5"/>
+          </p:nvPr>
+        </p:nvSpPr>
+        <p:spPr/>
+        <p:txBody>
+          <a:bodyPr/>
+          <a:lstStyle/>
+          <a:p>
+            <a:fld id="{003CA7F2-EEDD-4E62-9655-47418E641ACB}" type="slidenum">
+              <a:rPr lang="en-GB" smtClean="0"/>
+              <a:t>1</a:t>
+            </a:fld>
+            <a:endParaRPr lang="en-GB"/>
+          </a:p>
+        </p:txBody>
+      </p:sp>
+    </p:spTree>
+    <p:extLst>
+      <p:ext uri="{BB962C8B-B14F-4D97-AF65-F5344CB8AC3E}">
+        <p14:creationId xmlns:p14="http://schemas.microsoft.com/office/powerpoint/2010/main" val="1339256895"/>
+      </p:ext>
+    </p:extLst>
+  </p:cSld>
+  <p:clrMapOvr>
+    <a:masterClrMapping/>
+  </p:clrMapOvr>
+</p:notes>
+</file>
+
+<file path=ppt/notesSlides/notesSlide2.xml><?xml version="1.0" encoding="utf-8"?>
+<p:notes xmlns:a="http://schemas.openxmlformats.org/drawingml/2006/main" xmlns:r="http://schemas.openxmlformats.org/officeDocument/2006/relationships" xmlns:p="http://schemas.openxmlformats.org/presentationml/2006/main">
+  <p:cSld>
+    <p:spTree>
+      <p:nvGrpSpPr>
+        <p:cNvPr id="1" name=""/>
+        <p:cNvGrpSpPr/>
+        <p:nvPr/>
+      </p:nvGrpSpPr>
+      <p:grpSpPr>
+        <a:xfrm>
+          <a:off x="0" y="0"/>
+          <a:ext cx="0" cy="0"/>
+          <a:chOff x="0" y="0"/>
+          <a:chExt cx="0" cy="0"/>
+        </a:xfrm>
+      </p:grpSpPr>
+      <p:sp>
+        <p:nvSpPr>
+          <p:cNvPr id="2" name="Folienbildplatzhalter 1"/>
+          <p:cNvSpPr>
+            <a:spLocks noGrp="1" noRot="1" noChangeAspect="1"/>
+          </p:cNvSpPr>
+          <p:nvPr>
+            <p:ph type="sldImg"/>
+          </p:nvPr>
+        </p:nvSpPr>
+        <p:spPr/>
+      </p:sp>
+      <p:sp>
+        <p:nvSpPr>
+          <p:cNvPr id="3" name="Notizenplatzhalter 2"/>
+          <p:cNvSpPr>
+            <a:spLocks noGrp="1"/>
+          </p:cNvSpPr>
+          <p:nvPr>
+            <p:ph type="body" idx="1"/>
+          </p:nvPr>
+        </p:nvSpPr>
+        <p:spPr/>
+        <p:txBody>
+          <a:bodyPr/>
+          <a:lstStyle/>
+          <a:p>
+            <a:r>
+              <a:rPr lang="de-DE" sz="1200" dirty="0"/>
+              <a:t>Remote steuerbares Türschloss </a:t>
+            </a:r>
+          </a:p>
+          <a:p>
+            <a:r>
+              <a:rPr lang="de-DE" sz="1200" dirty="0"/>
+              <a:t>Abgesicherte Zero-trust Networking Lösung (265bit end </a:t>
+            </a:r>
+            <a:r>
+              <a:rPr lang="de-DE" sz="1200" dirty="0" err="1"/>
+              <a:t>to</a:t>
+            </a:r>
+            <a:r>
+              <a:rPr lang="de-DE" sz="1200" dirty="0"/>
+              <a:t> end verschlüsselt)</a:t>
+            </a:r>
+          </a:p>
+          <a:p>
+            <a:r>
+              <a:rPr lang="de-DE" sz="1200" dirty="0"/>
+              <a:t>Linear angetriebener Motor über Arduino gesteuert (fungiert als Türbolzen)</a:t>
+            </a:r>
+          </a:p>
+          <a:p>
+            <a:r>
+              <a:rPr lang="de-CH" sz="1200" dirty="0"/>
+              <a:t>Webapp zum öffnen und schliessen der Türen</a:t>
+            </a:r>
+          </a:p>
+          <a:p>
+            <a:r>
+              <a:rPr lang="de-CH" sz="1200" dirty="0"/>
+              <a:t>Fingerprintsensor um das Türschloss Vorort zu bedienen</a:t>
+            </a:r>
+          </a:p>
+          <a:p>
+            <a:r>
+              <a:rPr lang="de-CH" sz="1200" dirty="0"/>
+              <a:t>Status und Access Location wird geloggt und angezeigt</a:t>
+            </a:r>
+          </a:p>
+          <a:p>
+            <a:endParaRPr lang="de-CH" sz="1200" dirty="0"/>
+          </a:p>
+          <a:p>
+            <a:r>
+              <a:rPr lang="de-CH" sz="1200" dirty="0"/>
+              <a:t>Türschloss selber gebaut mit Komponenten aus 3D Drucker</a:t>
+            </a:r>
+          </a:p>
+          <a:p>
+            <a:endParaRPr lang="en-GB" dirty="0"/>
+          </a:p>
+        </p:txBody>
+      </p:sp>
+      <p:sp>
+        <p:nvSpPr>
+          <p:cNvPr id="4" name="Foliennummernplatzhalter 3"/>
+          <p:cNvSpPr>
+            <a:spLocks noGrp="1"/>
+          </p:cNvSpPr>
+          <p:nvPr>
+            <p:ph type="sldNum" sz="quarter" idx="5"/>
+          </p:nvPr>
+        </p:nvSpPr>
+        <p:spPr/>
+        <p:txBody>
+          <a:bodyPr/>
+          <a:lstStyle/>
+          <a:p>
+            <a:fld id="{003CA7F2-EEDD-4E62-9655-47418E641ACB}" type="slidenum">
+              <a:rPr lang="en-GB" smtClean="0"/>
+              <a:t>2</a:t>
+            </a:fld>
+            <a:endParaRPr lang="en-GB"/>
+          </a:p>
+        </p:txBody>
+      </p:sp>
+    </p:spTree>
+    <p:extLst>
+      <p:ext uri="{BB962C8B-B14F-4D97-AF65-F5344CB8AC3E}">
+        <p14:creationId xmlns:p14="http://schemas.microsoft.com/office/powerpoint/2010/main" val="3594575080"/>
+      </p:ext>
+    </p:extLst>
+  </p:cSld>
+  <p:clrMapOvr>
+    <a:masterClrMapping/>
+  </p:clrMapOvr>
+</p:notes>
 </file>
 
 <file path=ppt/slideLayouts/slideLayout1.xml><?xml version="1.0" encoding="utf-8"?>
@@ -274,7 +851,7 @@
           <a:p>
             <a:fld id="{A43CB70E-6A9B-4793-94DA-3FCFD31284BA}" type="datetimeFigureOut">
               <a:rPr lang="de-CH" smtClean="0"/>
-              <a:t>13.01.2022</a:t>
+              <a:t>16.01.2022</a:t>
             </a:fld>
             <a:endParaRPr lang="de-CH"/>
           </a:p>
@@ -474,7 +1051,7 @@
           <a:p>
             <a:fld id="{A43CB70E-6A9B-4793-94DA-3FCFD31284BA}" type="datetimeFigureOut">
               <a:rPr lang="de-CH" smtClean="0"/>
-              <a:t>13.01.2022</a:t>
+              <a:t>16.01.2022</a:t>
             </a:fld>
             <a:endParaRPr lang="de-CH"/>
           </a:p>
@@ -684,7 +1261,7 @@
           <a:p>
             <a:fld id="{A43CB70E-6A9B-4793-94DA-3FCFD31284BA}" type="datetimeFigureOut">
               <a:rPr lang="de-CH" smtClean="0"/>
-              <a:t>13.01.2022</a:t>
+              <a:t>16.01.2022</a:t>
             </a:fld>
             <a:endParaRPr lang="de-CH"/>
           </a:p>
@@ -884,7 +1461,7 @@
           <a:p>
             <a:fld id="{A43CB70E-6A9B-4793-94DA-3FCFD31284BA}" type="datetimeFigureOut">
               <a:rPr lang="de-CH" smtClean="0"/>
-              <a:t>13.01.2022</a:t>
+              <a:t>16.01.2022</a:t>
             </a:fld>
             <a:endParaRPr lang="de-CH"/>
           </a:p>
@@ -1160,7 +1737,7 @@
           <a:p>
             <a:fld id="{A43CB70E-6A9B-4793-94DA-3FCFD31284BA}" type="datetimeFigureOut">
               <a:rPr lang="de-CH" smtClean="0"/>
-              <a:t>13.01.2022</a:t>
+              <a:t>16.01.2022</a:t>
             </a:fld>
             <a:endParaRPr lang="de-CH"/>
           </a:p>
@@ -1428,7 +2005,7 @@
           <a:p>
             <a:fld id="{A43CB70E-6A9B-4793-94DA-3FCFD31284BA}" type="datetimeFigureOut">
               <a:rPr lang="de-CH" smtClean="0"/>
-              <a:t>13.01.2022</a:t>
+              <a:t>16.01.2022</a:t>
             </a:fld>
             <a:endParaRPr lang="de-CH"/>
           </a:p>
@@ -1843,7 +2420,7 @@
           <a:p>
             <a:fld id="{A43CB70E-6A9B-4793-94DA-3FCFD31284BA}" type="datetimeFigureOut">
               <a:rPr lang="de-CH" smtClean="0"/>
-              <a:t>13.01.2022</a:t>
+              <a:t>16.01.2022</a:t>
             </a:fld>
             <a:endParaRPr lang="de-CH"/>
           </a:p>
@@ -1985,7 +2562,7 @@
           <a:p>
             <a:fld id="{A43CB70E-6A9B-4793-94DA-3FCFD31284BA}" type="datetimeFigureOut">
               <a:rPr lang="de-CH" smtClean="0"/>
-              <a:t>13.01.2022</a:t>
+              <a:t>16.01.2022</a:t>
             </a:fld>
             <a:endParaRPr lang="de-CH"/>
           </a:p>
@@ -2098,7 +2675,7 @@
           <a:p>
             <a:fld id="{A43CB70E-6A9B-4793-94DA-3FCFD31284BA}" type="datetimeFigureOut">
               <a:rPr lang="de-CH" smtClean="0"/>
-              <a:t>13.01.2022</a:t>
+              <a:t>16.01.2022</a:t>
             </a:fld>
             <a:endParaRPr lang="de-CH"/>
           </a:p>
@@ -2411,7 +2988,7 @@
           <a:p>
             <a:fld id="{A43CB70E-6A9B-4793-94DA-3FCFD31284BA}" type="datetimeFigureOut">
               <a:rPr lang="de-CH" smtClean="0"/>
-              <a:t>13.01.2022</a:t>
+              <a:t>16.01.2022</a:t>
             </a:fld>
             <a:endParaRPr lang="de-CH"/>
           </a:p>
@@ -2700,7 +3277,7 @@
           <a:p>
             <a:fld id="{A43CB70E-6A9B-4793-94DA-3FCFD31284BA}" type="datetimeFigureOut">
               <a:rPr lang="de-CH" smtClean="0"/>
-              <a:t>13.01.2022</a:t>
+              <a:t>16.01.2022</a:t>
             </a:fld>
             <a:endParaRPr lang="de-CH"/>
           </a:p>
@@ -2943,7 +3520,7 @@
           <a:p>
             <a:fld id="{A43CB70E-6A9B-4793-94DA-3FCFD31284BA}" type="datetimeFigureOut">
               <a:rPr lang="de-CH" smtClean="0"/>
-              <a:t>13.01.2022</a:t>
+              <a:t>16.01.2022</a:t>
             </a:fld>
             <a:endParaRPr lang="de-CH"/>
           </a:p>
@@ -3370,10 +3947,10 @@
       </p:grpSpPr>
       <p:sp useBgFill="1">
         <p:nvSpPr>
-          <p:cNvPr id="14" name="Rectangle 13">
-            <a:extLst>
-              <a:ext uri="{FF2B5EF4-FFF2-40B4-BE49-F238E27FC236}">
-                <a16:creationId xmlns:a16="http://schemas.microsoft.com/office/drawing/2014/main" id="{657F69E0-C4B0-4BEC-A689-4F8D877F05D4}"/>
+          <p:cNvPr id="34" name="Rectangle 31">
+            <a:extLst>
+              <a:ext uri="{FF2B5EF4-FFF2-40B4-BE49-F238E27FC236}">
+                <a16:creationId xmlns:a16="http://schemas.microsoft.com/office/drawing/2014/main" id="{FA69AAE0-49D5-4C8B-8BA2-55898C00E05E}"/>
               </a:ext>
               <a:ext uri="{C183D7F6-B498-43B3-948B-1728B52AA6E4}">
                 <adec:decorative xmlns:adec="http://schemas.microsoft.com/office/drawing/2017/decorative" val="1"/>
@@ -3430,10 +4007,10 @@
       </p:sp>
       <p:pic>
         <p:nvPicPr>
-          <p:cNvPr id="5" name="Picture 4" descr="An open toilet door">
-            <a:extLst>
-              <a:ext uri="{FF2B5EF4-FFF2-40B4-BE49-F238E27FC236}">
-                <a16:creationId xmlns:a16="http://schemas.microsoft.com/office/drawing/2014/main" id="{38EAD7D4-C406-4F4E-BFD5-C95B13C03EBC}"/>
+          <p:cNvPr id="6" name="Grafik 5">
+            <a:extLst>
+              <a:ext uri="{FF2B5EF4-FFF2-40B4-BE49-F238E27FC236}">
+                <a16:creationId xmlns:a16="http://schemas.microsoft.com/office/drawing/2014/main" id="{A2E6CE6C-75BA-42CA-BB9C-D64C174A9D7A}"/>
               </a:ext>
             </a:extLst>
           </p:cNvPr>
@@ -3443,467 +4020,357 @@
           <p:nvPr/>
         </p:nvPicPr>
         <p:blipFill rotWithShape="1">
-          <a:blip r:embed="rId2">
-            <a:alphaModFix amt="50000"/>
+          <a:blip r:embed="rId3">
+            <a:extLst>
+              <a:ext uri="{28A0092B-C50C-407E-A947-70E740481C1C}">
+                <a14:useLocalDpi xmlns:a14="http://schemas.microsoft.com/office/drawing/2010/main" val="0"/>
+              </a:ext>
+            </a:extLst>
           </a:blip>
-          <a:srcRect t="2090" r="-1" b="13302"/>
+          <a:srcRect r="2" b="8983"/>
           <a:stretch/>
         </p:blipFill>
         <p:spPr>
           <a:xfrm>
-            <a:off x="20" y="10"/>
-            <a:ext cx="12188930" cy="6857990"/>
-          </a:xfrm>
-          <a:prstGeom prst="rect">
-            <a:avLst/>
-          </a:prstGeom>
-        </p:spPr>
-      </p:pic>
-      <p:sp>
-        <p:nvSpPr>
-          <p:cNvPr id="2" name="Titel 1">
-            <a:extLst>
-              <a:ext uri="{FF2B5EF4-FFF2-40B4-BE49-F238E27FC236}">
-                <a16:creationId xmlns:a16="http://schemas.microsoft.com/office/drawing/2014/main" id="{2418A28F-4BC3-446D-B962-6C42A9A6D8A3}"/>
-              </a:ext>
-            </a:extLst>
-          </p:cNvPr>
-          <p:cNvSpPr>
-            <a:spLocks noGrp="1"/>
-          </p:cNvSpPr>
-          <p:nvPr>
-            <p:ph type="ctrTitle"/>
-          </p:nvPr>
-        </p:nvSpPr>
-        <p:spPr>
-          <a:xfrm>
-            <a:off x="1524000" y="1122363"/>
-            <a:ext cx="9144000" cy="3063240"/>
-          </a:xfrm>
-        </p:spPr>
-        <p:txBody>
-          <a:bodyPr>
-            <a:normAutofit/>
-          </a:bodyPr>
-          <a:lstStyle/>
-          <a:p>
-            <a:r>
-              <a:rPr lang="de-DE" sz="6600" dirty="0">
-                <a:solidFill>
-                  <a:srgbClr val="FFFFFF"/>
-                </a:solidFill>
-              </a:rPr>
-              <a:t>Remote Door Control</a:t>
-            </a:r>
-            <a:endParaRPr lang="de-CH" sz="6600" dirty="0">
-              <a:solidFill>
-                <a:srgbClr val="FFFFFF"/>
-              </a:solidFill>
-            </a:endParaRPr>
-          </a:p>
-        </p:txBody>
-      </p:sp>
-      <p:sp>
-        <p:nvSpPr>
-          <p:cNvPr id="3" name="Untertitel 2">
-            <a:extLst>
-              <a:ext uri="{FF2B5EF4-FFF2-40B4-BE49-F238E27FC236}">
-                <a16:creationId xmlns:a16="http://schemas.microsoft.com/office/drawing/2014/main" id="{F9FA0D5B-AC16-4CC9-8FB7-4DD9CCDE30C8}"/>
-              </a:ext>
-            </a:extLst>
-          </p:cNvPr>
-          <p:cNvSpPr>
-            <a:spLocks noGrp="1"/>
-          </p:cNvSpPr>
-          <p:nvPr>
-            <p:ph type="subTitle" idx="1"/>
-          </p:nvPr>
-        </p:nvSpPr>
-        <p:spPr>
-          <a:xfrm>
-            <a:off x="1527048" y="4599432"/>
-            <a:ext cx="9144000" cy="1536192"/>
-          </a:xfrm>
-        </p:spPr>
-        <p:txBody>
-          <a:bodyPr>
-            <a:normAutofit/>
-          </a:bodyPr>
-          <a:lstStyle/>
-          <a:p>
-            <a:r>
-              <a:rPr lang="de-DE" dirty="0">
-                <a:solidFill>
-                  <a:srgbClr val="FFFFFF"/>
-                </a:solidFill>
-              </a:rPr>
-              <a:t>Sebastian Fernandez</a:t>
-            </a:r>
-          </a:p>
-          <a:p>
-            <a:r>
-              <a:rPr lang="de-DE" dirty="0">
-                <a:solidFill>
-                  <a:srgbClr val="FFFFFF"/>
-                </a:solidFill>
-              </a:rPr>
-              <a:t>Christian Wernli</a:t>
-            </a:r>
-            <a:endParaRPr lang="de-CH" dirty="0">
-              <a:solidFill>
-                <a:srgbClr val="FFFFFF"/>
-              </a:solidFill>
-            </a:endParaRPr>
-          </a:p>
-        </p:txBody>
-      </p:sp>
-      <p:sp>
-        <p:nvSpPr>
-          <p:cNvPr id="16" name="sketchy line">
-            <a:extLst>
-              <a:ext uri="{FF2B5EF4-FFF2-40B4-BE49-F238E27FC236}">
-                <a16:creationId xmlns:a16="http://schemas.microsoft.com/office/drawing/2014/main" id="{9F6380B4-6A1C-481E-8408-B4E6C75B9B81}"/>
-              </a:ext>
-              <a:ext uri="{C183D7F6-B498-43B3-948B-1728B52AA6E4}">
-                <adec:decorative xmlns:adec="http://schemas.microsoft.com/office/drawing/2017/decorative" val="1"/>
-              </a:ext>
-            </a:extLst>
-          </p:cNvPr>
-          <p:cNvSpPr>
-            <a:spLocks noGrp="1" noRot="1" noChangeAspect="1" noMove="1" noResize="1" noEditPoints="1" noAdjustHandles="1" noChangeArrowheads="1" noChangeShapeType="1" noTextEdit="1"/>
-          </p:cNvSpPr>
-          <p:nvPr>
-            <p:extLst>
-              <p:ext uri="{386F3935-93C4-4BCD-93E2-E3B085C9AB24}">
-                <p16:designElem xmlns:p16="http://schemas.microsoft.com/office/powerpoint/2015/main" val="1"/>
-              </p:ext>
-            </p:extLst>
-          </p:nvPr>
-        </p:nvSpPr>
-        <p:spPr>
-          <a:xfrm>
-            <a:off x="3974206" y="4368623"/>
-            <a:ext cx="4243589" cy="18288"/>
+            <a:off x="-4" y="-4"/>
+            <a:ext cx="7534640" cy="6857984"/>
           </a:xfrm>
           <a:custGeom>
             <a:avLst/>
-            <a:gdLst>
-              <a:gd name="connsiteX0" fmla="*/ 0 w 4243589"/>
-              <a:gd name="connsiteY0" fmla="*/ 0 h 18288"/>
-              <a:gd name="connsiteX1" fmla="*/ 478919 w 4243589"/>
-              <a:gd name="connsiteY1" fmla="*/ 0 h 18288"/>
-              <a:gd name="connsiteX2" fmla="*/ 957839 w 4243589"/>
-              <a:gd name="connsiteY2" fmla="*/ 0 h 18288"/>
-              <a:gd name="connsiteX3" fmla="*/ 1521630 w 4243589"/>
-              <a:gd name="connsiteY3" fmla="*/ 0 h 18288"/>
-              <a:gd name="connsiteX4" fmla="*/ 2212729 w 4243589"/>
-              <a:gd name="connsiteY4" fmla="*/ 0 h 18288"/>
-              <a:gd name="connsiteX5" fmla="*/ 2734084 w 4243589"/>
-              <a:gd name="connsiteY5" fmla="*/ 0 h 18288"/>
-              <a:gd name="connsiteX6" fmla="*/ 3255439 w 4243589"/>
-              <a:gd name="connsiteY6" fmla="*/ 0 h 18288"/>
-              <a:gd name="connsiteX7" fmla="*/ 4243589 w 4243589"/>
-              <a:gd name="connsiteY7" fmla="*/ 0 h 18288"/>
-              <a:gd name="connsiteX8" fmla="*/ 4243589 w 4243589"/>
-              <a:gd name="connsiteY8" fmla="*/ 18288 h 18288"/>
-              <a:gd name="connsiteX9" fmla="*/ 3594926 w 4243589"/>
-              <a:gd name="connsiteY9" fmla="*/ 18288 h 18288"/>
-              <a:gd name="connsiteX10" fmla="*/ 3073571 w 4243589"/>
-              <a:gd name="connsiteY10" fmla="*/ 18288 h 18288"/>
-              <a:gd name="connsiteX11" fmla="*/ 2552216 w 4243589"/>
-              <a:gd name="connsiteY11" fmla="*/ 18288 h 18288"/>
-              <a:gd name="connsiteX12" fmla="*/ 1903553 w 4243589"/>
-              <a:gd name="connsiteY12" fmla="*/ 18288 h 18288"/>
-              <a:gd name="connsiteX13" fmla="*/ 1212454 w 4243589"/>
-              <a:gd name="connsiteY13" fmla="*/ 18288 h 18288"/>
-              <a:gd name="connsiteX14" fmla="*/ 733535 w 4243589"/>
-              <a:gd name="connsiteY14" fmla="*/ 18288 h 18288"/>
-              <a:gd name="connsiteX15" fmla="*/ 0 w 4243589"/>
-              <a:gd name="connsiteY15" fmla="*/ 18288 h 18288"/>
-              <a:gd name="connsiteX16" fmla="*/ 0 w 4243589"/>
-              <a:gd name="connsiteY16" fmla="*/ 0 h 18288"/>
-            </a:gdLst>
+            <a:gdLst/>
             <a:ahLst/>
-            <a:cxnLst>
-              <a:cxn ang="0">
-                <a:pos x="connsiteX0" y="connsiteY0"/>
-              </a:cxn>
-              <a:cxn ang="0">
-                <a:pos x="connsiteX1" y="connsiteY1"/>
-              </a:cxn>
-              <a:cxn ang="0">
-                <a:pos x="connsiteX2" y="connsiteY2"/>
-              </a:cxn>
-              <a:cxn ang="0">
-                <a:pos x="connsiteX3" y="connsiteY3"/>
-              </a:cxn>
-              <a:cxn ang="0">
-                <a:pos x="connsiteX4" y="connsiteY4"/>
-              </a:cxn>
-              <a:cxn ang="0">
-                <a:pos x="connsiteX5" y="connsiteY5"/>
-              </a:cxn>
-              <a:cxn ang="0">
-                <a:pos x="connsiteX6" y="connsiteY6"/>
-              </a:cxn>
-              <a:cxn ang="0">
-                <a:pos x="connsiteX7" y="connsiteY7"/>
-              </a:cxn>
-              <a:cxn ang="0">
-                <a:pos x="connsiteX8" y="connsiteY8"/>
-              </a:cxn>
-              <a:cxn ang="0">
-                <a:pos x="connsiteX9" y="connsiteY9"/>
-              </a:cxn>
-              <a:cxn ang="0">
-                <a:pos x="connsiteX10" y="connsiteY10"/>
-              </a:cxn>
-              <a:cxn ang="0">
-                <a:pos x="connsiteX11" y="connsiteY11"/>
-              </a:cxn>
-              <a:cxn ang="0">
-                <a:pos x="connsiteX12" y="connsiteY12"/>
-              </a:cxn>
-              <a:cxn ang="0">
-                <a:pos x="connsiteX13" y="connsiteY13"/>
-              </a:cxn>
-              <a:cxn ang="0">
-                <a:pos x="connsiteX14" y="connsiteY14"/>
-              </a:cxn>
-              <a:cxn ang="0">
-                <a:pos x="connsiteX15" y="connsiteY15"/>
-              </a:cxn>
-              <a:cxn ang="0">
-                <a:pos x="connsiteX16" y="connsiteY16"/>
-              </a:cxn>
-            </a:cxnLst>
+            <a:cxnLst/>
             <a:rect l="l" t="t" r="r" b="b"/>
             <a:pathLst>
-              <a:path w="4243589" h="18288" fill="none" extrusionOk="0">
+              <a:path w="7534640" h="6857984">
                 <a:moveTo>
                   <a:pt x="0" y="0"/>
                 </a:moveTo>
+                <a:lnTo>
+                  <a:pt x="7534640" y="0"/>
+                </a:lnTo>
+                <a:lnTo>
+                  <a:pt x="7534640" y="3832811"/>
+                </a:lnTo>
+                <a:lnTo>
+                  <a:pt x="7344853" y="3826712"/>
+                </a:lnTo>
                 <a:cubicBezTo>
-                  <a:pt x="213395" y="-21006"/>
-                  <a:pt x="307421" y="-18116"/>
-                  <a:pt x="478919" y="0"/>
+                  <a:pt x="7344853" y="3826712"/>
+                  <a:pt x="7341511" y="3826712"/>
+                  <a:pt x="7341511" y="3826712"/>
                 </a:cubicBezTo>
                 <a:cubicBezTo>
-                  <a:pt x="650417" y="18116"/>
-                  <a:pt x="831092" y="-21237"/>
-                  <a:pt x="957839" y="0"/>
+                  <a:pt x="7274667" y="3823370"/>
+                  <a:pt x="7211169" y="3823370"/>
+                  <a:pt x="7144324" y="3820027"/>
                 </a:cubicBezTo>
                 <a:cubicBezTo>
-                  <a:pt x="1084586" y="21237"/>
-                  <a:pt x="1301682" y="25124"/>
-                  <a:pt x="1521630" y="0"/>
+                  <a:pt x="6913719" y="3820027"/>
+                  <a:pt x="6683113" y="3820027"/>
+                  <a:pt x="6455848" y="3820027"/>
                 </a:cubicBezTo>
                 <a:cubicBezTo>
-                  <a:pt x="1741578" y="-25124"/>
-                  <a:pt x="1970269" y="-29139"/>
-                  <a:pt x="2212729" y="0"/>
+                  <a:pt x="6231926" y="3910265"/>
+                  <a:pt x="5987951" y="3833396"/>
+                  <a:pt x="5767372" y="3903581"/>
                 </a:cubicBezTo>
                 <a:cubicBezTo>
-                  <a:pt x="2455189" y="29139"/>
-                  <a:pt x="2558847" y="-4796"/>
-                  <a:pt x="2734084" y="0"/>
+                  <a:pt x="5533423" y="3900239"/>
+                  <a:pt x="5312845" y="3970423"/>
+                  <a:pt x="5082238" y="4000503"/>
                 </a:cubicBezTo>
                 <a:cubicBezTo>
-                  <a:pt x="2909321" y="4796"/>
-                  <a:pt x="3097217" y="-13409"/>
-                  <a:pt x="3255439" y="0"/>
+                  <a:pt x="4908446" y="4013871"/>
+                  <a:pt x="4731314" y="3997160"/>
+                  <a:pt x="4570892" y="4067345"/>
                 </a:cubicBezTo>
                 <a:cubicBezTo>
-                  <a:pt x="3413662" y="13409"/>
-                  <a:pt x="3979999" y="-10121"/>
-                  <a:pt x="4243589" y="0"/>
+                  <a:pt x="4447233" y="4124161"/>
+                  <a:pt x="4350312" y="4197688"/>
+                  <a:pt x="4483996" y="4348083"/>
                 </a:cubicBezTo>
                 <a:cubicBezTo>
-                  <a:pt x="4244484" y="8974"/>
-                  <a:pt x="4243043" y="9359"/>
-                  <a:pt x="4243589" y="18288"/>
+                  <a:pt x="4644419" y="4344742"/>
+                  <a:pt x="4627708" y="4598742"/>
+                  <a:pt x="4788129" y="4561979"/>
                 </a:cubicBezTo>
                 <a:cubicBezTo>
-                  <a:pt x="4058777" y="31246"/>
-                  <a:pt x="3910348" y="3158"/>
-                  <a:pt x="3594926" y="18288"/>
+                  <a:pt x="4754709" y="4678954"/>
+                  <a:pt x="4641076" y="4618795"/>
+                  <a:pt x="4600971" y="4705690"/>
                 </a:cubicBezTo>
                 <a:cubicBezTo>
-                  <a:pt x="3279504" y="33418"/>
-                  <a:pt x="3319955" y="-3977"/>
-                  <a:pt x="3073571" y="18288"/>
+                  <a:pt x="4684524" y="4779217"/>
+                  <a:pt x="4844945" y="4725744"/>
+                  <a:pt x="4871683" y="4879480"/>
                 </a:cubicBezTo>
                 <a:cubicBezTo>
-                  <a:pt x="2827187" y="40553"/>
-                  <a:pt x="2767387" y="1863"/>
-                  <a:pt x="2552216" y="18288"/>
+                  <a:pt x="4838262" y="5039902"/>
+                  <a:pt x="4945210" y="5019849"/>
+                  <a:pt x="5032105" y="5029876"/>
                 </a:cubicBezTo>
                 <a:cubicBezTo>
-                  <a:pt x="2337046" y="34713"/>
-                  <a:pt x="2181871" y="19527"/>
-                  <a:pt x="1903553" y="18288"/>
+                  <a:pt x="5239317" y="5049930"/>
+                  <a:pt x="5439843" y="5063297"/>
+                  <a:pt x="5643713" y="5096719"/>
                 </a:cubicBezTo>
                 <a:cubicBezTo>
-                  <a:pt x="1625235" y="17049"/>
-                  <a:pt x="1557672" y="24174"/>
-                  <a:pt x="1212454" y="18288"/>
+                  <a:pt x="5693844" y="5106745"/>
+                  <a:pt x="5810819" y="5083350"/>
+                  <a:pt x="5800794" y="5186956"/>
                 </a:cubicBezTo>
                 <a:cubicBezTo>
-                  <a:pt x="867236" y="12402"/>
-                  <a:pt x="874382" y="15627"/>
-                  <a:pt x="733535" y="18288"/>
+                  <a:pt x="5790767" y="5270508"/>
+                  <a:pt x="5700529" y="5240431"/>
+                  <a:pt x="5643713" y="5243772"/>
                 </a:cubicBezTo>
                 <a:cubicBezTo>
-                  <a:pt x="592688" y="20949"/>
-                  <a:pt x="183477" y="14753"/>
-                  <a:pt x="0" y="18288"/>
+                  <a:pt x="5329553" y="5283879"/>
+                  <a:pt x="5012052" y="5220378"/>
+                  <a:pt x="4701235" y="5223719"/>
                 </a:cubicBezTo>
                 <a:cubicBezTo>
-                  <a:pt x="-229" y="14222"/>
-                  <a:pt x="509" y="5816"/>
-                  <a:pt x="0" y="0"/>
-                </a:cubicBezTo>
-                <a:close/>
-              </a:path>
-              <a:path w="4243589" h="18288" stroke="0" extrusionOk="0">
-                <a:moveTo>
-                  <a:pt x="0" y="0"/>
-                </a:moveTo>
-                <a:cubicBezTo>
-                  <a:pt x="143690" y="16630"/>
-                  <a:pt x="266667" y="14847"/>
-                  <a:pt x="521355" y="0"/>
+                  <a:pt x="4664472" y="5223719"/>
+                  <a:pt x="4657787" y="5334009"/>
+                  <a:pt x="4577576" y="5297246"/>
                 </a:cubicBezTo>
                 <a:cubicBezTo>
-                  <a:pt x="776043" y="-14847"/>
-                  <a:pt x="814491" y="-17363"/>
-                  <a:pt x="1000275" y="0"/>
+                  <a:pt x="4788129" y="5397510"/>
+                  <a:pt x="5767372" y="5424248"/>
+                  <a:pt x="6094900" y="5477721"/>
                 </a:cubicBezTo>
                 <a:cubicBezTo>
-                  <a:pt x="1186059" y="17363"/>
-                  <a:pt x="1352504" y="-23507"/>
-                  <a:pt x="1521630" y="0"/>
+                  <a:pt x="5754004" y="5858724"/>
+                  <a:pt x="5429817" y="5628117"/>
+                  <a:pt x="5159105" y="5842012"/>
                 </a:cubicBezTo>
                 <a:cubicBezTo>
-                  <a:pt x="1690756" y="23507"/>
-                  <a:pt x="1889525" y="5871"/>
-                  <a:pt x="2127857" y="0"/>
+                  <a:pt x="5159105" y="5842012"/>
+                  <a:pt x="5212580" y="5842012"/>
+                  <a:pt x="5443187" y="5912197"/>
                 </a:cubicBezTo>
                 <a:cubicBezTo>
-                  <a:pt x="2366189" y="-5871"/>
-                  <a:pt x="2620628" y="-27997"/>
-                  <a:pt x="2776520" y="0"/>
+                  <a:pt x="5627002" y="5969012"/>
+                  <a:pt x="5536765" y="6049223"/>
+                  <a:pt x="6001321" y="6202962"/>
                 </a:cubicBezTo>
                 <a:cubicBezTo>
-                  <a:pt x="2932412" y="27997"/>
-                  <a:pt x="3131683" y="-25073"/>
-                  <a:pt x="3467618" y="0"/>
+                  <a:pt x="5824188" y="6253093"/>
+                  <a:pt x="5593581" y="6156172"/>
+                  <a:pt x="5506685" y="6416857"/>
                 </a:cubicBezTo>
                 <a:cubicBezTo>
-                  <a:pt x="3803553" y="25073"/>
-                  <a:pt x="4017371" y="3071"/>
-                  <a:pt x="4243589" y="0"/>
+                  <a:pt x="5643713" y="6463648"/>
+                  <a:pt x="5807477" y="6420200"/>
+                  <a:pt x="5904398" y="6543858"/>
                 </a:cubicBezTo>
                 <a:cubicBezTo>
-                  <a:pt x="4243134" y="6162"/>
-                  <a:pt x="4243492" y="11775"/>
-                  <a:pt x="4243589" y="18288"/>
+                  <a:pt x="5934478" y="6580622"/>
+                  <a:pt x="5964557" y="6604017"/>
+                  <a:pt x="6001321" y="6624068"/>
                 </a:cubicBezTo>
                 <a:cubicBezTo>
-                  <a:pt x="4017834" y="-5779"/>
-                  <a:pt x="3834586" y="13376"/>
-                  <a:pt x="3594926" y="18288"/>
+                  <a:pt x="5984612" y="6630754"/>
+                  <a:pt x="5964557" y="6637437"/>
+                  <a:pt x="5951188" y="6644121"/>
                 </a:cubicBezTo>
                 <a:cubicBezTo>
-                  <a:pt x="3355266" y="23200"/>
-                  <a:pt x="3204179" y="2869"/>
-                  <a:pt x="2903827" y="18288"/>
+                  <a:pt x="5977925" y="6667518"/>
+                  <a:pt x="6663060" y="6794517"/>
+                  <a:pt x="6836850" y="6797860"/>
                 </a:cubicBezTo>
                 <a:cubicBezTo>
-                  <a:pt x="2603475" y="33707"/>
-                  <a:pt x="2526187" y="46187"/>
-                  <a:pt x="2212729" y="18288"/>
+                  <a:pt x="6761652" y="6822926"/>
+                  <a:pt x="6636845" y="6844075"/>
+                  <a:pt x="6553814" y="6856412"/>
                 </a:cubicBezTo>
-                <a:cubicBezTo>
-                  <a:pt x="1899271" y="-9611"/>
-                  <a:pt x="1966289" y="29692"/>
-                  <a:pt x="1733809" y="18288"/>
-                </a:cubicBezTo>
-                <a:cubicBezTo>
-                  <a:pt x="1501329" y="6884"/>
-                  <a:pt x="1343612" y="12492"/>
-                  <a:pt x="1085146" y="18288"/>
-                </a:cubicBezTo>
-                <a:cubicBezTo>
-                  <a:pt x="826680" y="24084"/>
-                  <a:pt x="778184" y="35607"/>
-                  <a:pt x="521355" y="18288"/>
-                </a:cubicBezTo>
-                <a:cubicBezTo>
-                  <a:pt x="264526" y="969"/>
-                  <a:pt x="120277" y="4268"/>
-                  <a:pt x="0" y="18288"/>
-                </a:cubicBezTo>
-                <a:cubicBezTo>
-                  <a:pt x="766" y="10800"/>
-                  <a:pt x="-457" y="8180"/>
-                  <a:pt x="0" y="0"/>
-                </a:cubicBezTo>
+                <a:lnTo>
+                  <a:pt x="6542822" y="6857984"/>
+                </a:lnTo>
+                <a:lnTo>
+                  <a:pt x="0" y="6857984"/>
+                </a:lnTo>
                 <a:close/>
               </a:path>
             </a:pathLst>
           </a:custGeom>
-          <a:solidFill>
-            <a:srgbClr val="FFFFFF">
-              <a:alpha val="75000"/>
-            </a:srgbClr>
-          </a:solidFill>
-          <a:ln w="44450" cap="rnd">
-            <a:solidFill>
-              <a:srgbClr val="FFFFFF">
-                <a:alpha val="75000"/>
-              </a:srgbClr>
-            </a:solidFill>
-            <a:round/>
-            <a:extLst>
-              <a:ext uri="{C807C97D-BFC1-408E-A445-0C87EB9F89A2}">
-                <ask:lineSketchStyleProps xmlns:ask="http://schemas.microsoft.com/office/drawing/2018/sketchyshapes" sd="2727557108">
-                  <a:prstGeom prst="rect">
-                    <a:avLst/>
-                  </a:prstGeom>
-                  <ask:type>
-                    <ask:lineSketchFreehand/>
-                  </ask:type>
-                </ask:lineSketchStyleProps>
-              </a:ext>
-            </a:extLst>
-          </a:ln>
         </p:spPr>
-        <p:style>
-          <a:lnRef idx="2">
-            <a:schemeClr val="accent1">
-              <a:shade val="50000"/>
-            </a:schemeClr>
-          </a:lnRef>
-          <a:fillRef idx="1">
-            <a:schemeClr val="accent1"/>
-          </a:fillRef>
-          <a:effectRef idx="0">
-            <a:schemeClr val="accent1"/>
-          </a:effectRef>
-          <a:fontRef idx="minor">
-            <a:schemeClr val="lt1"/>
-          </a:fontRef>
-        </p:style>
-        <p:txBody>
-          <a:bodyPr rtlCol="0" anchor="ctr"/>
-          <a:lstStyle/>
-          <a:p>
-            <a:pPr algn="ctr"/>
-            <a:endParaRPr lang="en-US"/>
-          </a:p>
-        </p:txBody>
-      </p:sp>
+      </p:pic>
+      <p:sp>
+        <p:nvSpPr>
+          <p:cNvPr id="2" name="Titel 1">
+            <a:extLst>
+              <a:ext uri="{FF2B5EF4-FFF2-40B4-BE49-F238E27FC236}">
+                <a16:creationId xmlns:a16="http://schemas.microsoft.com/office/drawing/2014/main" id="{2418A28F-4BC3-446D-B962-6C42A9A6D8A3}"/>
+              </a:ext>
+            </a:extLst>
+          </p:cNvPr>
+          <p:cNvSpPr>
+            <a:spLocks noGrp="1"/>
+          </p:cNvSpPr>
+          <p:nvPr>
+            <p:ph type="ctrTitle"/>
+          </p:nvPr>
+        </p:nvSpPr>
+        <p:spPr>
+          <a:xfrm>
+            <a:off x="6343650" y="3962400"/>
+            <a:ext cx="5505814" cy="1690409"/>
+          </a:xfrm>
+        </p:spPr>
+        <p:txBody>
+          <a:bodyPr anchor="b">
+            <a:normAutofit/>
+          </a:bodyPr>
+          <a:lstStyle/>
+          <a:p>
+            <a:pPr algn="l"/>
+            <a:r>
+              <a:rPr lang="de-DE" sz="4400"/>
+              <a:t>Remote Door Control</a:t>
+            </a:r>
+            <a:endParaRPr lang="de-CH" sz="4400"/>
+          </a:p>
+        </p:txBody>
+      </p:sp>
+      <p:sp>
+        <p:nvSpPr>
+          <p:cNvPr id="3" name="Untertitel 2">
+            <a:extLst>
+              <a:ext uri="{FF2B5EF4-FFF2-40B4-BE49-F238E27FC236}">
+                <a16:creationId xmlns:a16="http://schemas.microsoft.com/office/drawing/2014/main" id="{F9FA0D5B-AC16-4CC9-8FB7-4DD9CCDE30C8}"/>
+              </a:ext>
+            </a:extLst>
+          </p:cNvPr>
+          <p:cNvSpPr>
+            <a:spLocks noGrp="1"/>
+          </p:cNvSpPr>
+          <p:nvPr>
+            <p:ph type="subTitle" idx="1"/>
+          </p:nvPr>
+        </p:nvSpPr>
+        <p:spPr>
+          <a:xfrm>
+            <a:off x="6343650" y="5709565"/>
+            <a:ext cx="5395975" cy="646785"/>
+          </a:xfrm>
+        </p:spPr>
+        <p:txBody>
+          <a:bodyPr>
+            <a:normAutofit/>
+          </a:bodyPr>
+          <a:lstStyle/>
+          <a:p>
+            <a:pPr algn="l"/>
+            <a:r>
+              <a:rPr lang="de-DE" sz="1500"/>
+              <a:t>Sebastian Fernandez</a:t>
+            </a:r>
+          </a:p>
+          <a:p>
+            <a:pPr algn="l"/>
+            <a:r>
+              <a:rPr lang="de-DE" sz="1500"/>
+              <a:t>Christian Wernli</a:t>
+            </a:r>
+            <a:endParaRPr lang="de-CH" sz="1500"/>
+          </a:p>
+        </p:txBody>
+      </p:sp>
+      <p:pic>
+        <p:nvPicPr>
+          <p:cNvPr id="5" name="Picture 4" descr="An open toilet door">
+            <a:extLst>
+              <a:ext uri="{FF2B5EF4-FFF2-40B4-BE49-F238E27FC236}">
+                <a16:creationId xmlns:a16="http://schemas.microsoft.com/office/drawing/2014/main" id="{38EAD7D4-C406-4F4E-BFD5-C95B13C03EBC}"/>
+              </a:ext>
+            </a:extLst>
+          </p:cNvPr>
+          <p:cNvPicPr>
+            <a:picLocks noChangeAspect="1"/>
+          </p:cNvPicPr>
+          <p:nvPr/>
+        </p:nvPicPr>
+        <p:blipFill rotWithShape="1">
+          <a:blip r:embed="rId4"/>
+          <a:srcRect l="1965" r="20194" b="-1"/>
+          <a:stretch/>
+        </p:blipFill>
+        <p:spPr>
+          <a:xfrm>
+            <a:off x="7653541" y="6"/>
+            <a:ext cx="4538463" cy="3877247"/>
+          </a:xfrm>
+          <a:custGeom>
+            <a:avLst/>
+            <a:gdLst/>
+            <a:ahLst/>
+            <a:cxnLst/>
+            <a:rect l="l" t="t" r="r" b="b"/>
+            <a:pathLst>
+              <a:path w="4538463" h="3877247">
+                <a:moveTo>
+                  <a:pt x="0" y="0"/>
+                </a:moveTo>
+                <a:lnTo>
+                  <a:pt x="4538463" y="0"/>
+                </a:lnTo>
+                <a:lnTo>
+                  <a:pt x="4538463" y="3437173"/>
+                </a:lnTo>
+                <a:lnTo>
+                  <a:pt x="4530710" y="3429000"/>
+                </a:lnTo>
+                <a:cubicBezTo>
+                  <a:pt x="4370289" y="3495842"/>
+                  <a:pt x="4239946" y="3686344"/>
+                  <a:pt x="4056129" y="3636211"/>
+                </a:cubicBezTo>
+                <a:cubicBezTo>
+                  <a:pt x="3872313" y="3589422"/>
+                  <a:pt x="3788760" y="3830055"/>
+                  <a:pt x="3618310" y="3756528"/>
+                </a:cubicBezTo>
+                <a:cubicBezTo>
+                  <a:pt x="3394389" y="3823371"/>
+                  <a:pt x="3163783" y="3823371"/>
+                  <a:pt x="2933176" y="3810002"/>
+                </a:cubicBezTo>
+                <a:cubicBezTo>
+                  <a:pt x="2702570" y="3840081"/>
+                  <a:pt x="2471962" y="3873503"/>
+                  <a:pt x="2238015" y="3850107"/>
+                </a:cubicBezTo>
+                <a:cubicBezTo>
+                  <a:pt x="2007408" y="3870161"/>
+                  <a:pt x="1783486" y="3883529"/>
+                  <a:pt x="1552880" y="3863476"/>
+                </a:cubicBezTo>
+                <a:cubicBezTo>
+                  <a:pt x="1322274" y="3886870"/>
+                  <a:pt x="1091667" y="3876844"/>
+                  <a:pt x="864402" y="3860134"/>
+                </a:cubicBezTo>
+                <a:cubicBezTo>
+                  <a:pt x="757455" y="3860134"/>
+                  <a:pt x="653849" y="3856792"/>
+                  <a:pt x="546902" y="3856792"/>
+                </a:cubicBezTo>
+                <a:cubicBezTo>
+                  <a:pt x="404861" y="3850108"/>
+                  <a:pt x="262821" y="3845095"/>
+                  <a:pt x="120363" y="3840499"/>
+                </a:cubicBezTo>
+                <a:lnTo>
+                  <a:pt x="0" y="3836632"/>
+                </a:lnTo>
+                <a:close/>
+              </a:path>
+            </a:pathLst>
+          </a:custGeom>
+        </p:spPr>
+      </p:pic>
     </p:spTree>
     <p:extLst>
       <p:ext uri="{BB962C8B-B14F-4D97-AF65-F5344CB8AC3E}">
@@ -3912,7 +4379,7 @@
     </p:extLst>
   </p:cSld>
   <p:clrMapOvr>
-    <a:overrideClrMapping bg1="dk1" tx1="lt1" bg2="dk2" tx2="lt2" accent1="accent1" accent2="accent2" accent3="accent3" accent4="accent4" accent5="accent5" accent6="accent6" hlink="hlink" folHlink="folHlink"/>
+    <a:masterClrMapping/>
   </p:clrMapOvr>
   <p:timing>
     <p:tnLst>
@@ -4444,98 +4911,13 @@
                   <a:srgbClr val="FFFFFF"/>
                 </a:solidFill>
               </a:rPr>
-              <a:t>Projektübersicht</a:t>
+              <a:t>Use Case</a:t>
             </a:r>
             <a:endParaRPr lang="de-CH" sz="4000" dirty="0">
               <a:solidFill>
                 <a:srgbClr val="FFFFFF"/>
               </a:solidFill>
             </a:endParaRPr>
-          </a:p>
-        </p:txBody>
-      </p:sp>
-      <p:sp>
-        <p:nvSpPr>
-          <p:cNvPr id="3" name="Inhaltsplatzhalter 2">
-            <a:extLst>
-              <a:ext uri="{FF2B5EF4-FFF2-40B4-BE49-F238E27FC236}">
-                <a16:creationId xmlns:a16="http://schemas.microsoft.com/office/drawing/2014/main" id="{8C884B60-BFC4-4473-91C9-DC5E59F749D8}"/>
-              </a:ext>
-            </a:extLst>
-          </p:cNvPr>
-          <p:cNvSpPr>
-            <a:spLocks noGrp="1"/>
-          </p:cNvSpPr>
-          <p:nvPr>
-            <p:ph idx="1"/>
-          </p:nvPr>
-        </p:nvSpPr>
-        <p:spPr>
-          <a:xfrm>
-            <a:off x="1371599" y="2318197"/>
-            <a:ext cx="9724031" cy="3683358"/>
-          </a:xfrm>
-        </p:spPr>
-        <p:txBody>
-          <a:bodyPr anchor="ctr">
-            <a:normAutofit/>
-          </a:bodyPr>
-          <a:lstStyle/>
-          <a:p>
-            <a:r>
-              <a:rPr lang="de-DE" sz="2000" dirty="0"/>
-              <a:t>Remote steuerbares Türschloss </a:t>
-            </a:r>
-          </a:p>
-          <a:p>
-            <a:r>
-              <a:rPr lang="de-DE" sz="2000" dirty="0"/>
-              <a:t>Abgesicherte Zero-trust Networking Lösung (265bit end </a:t>
-            </a:r>
-            <a:r>
-              <a:rPr lang="de-DE" sz="2000" dirty="0" err="1"/>
-              <a:t>to</a:t>
-            </a:r>
-            <a:r>
-              <a:rPr lang="de-DE" sz="2000" dirty="0"/>
-              <a:t> end verschlüsselt)</a:t>
-            </a:r>
-          </a:p>
-          <a:p>
-            <a:r>
-              <a:rPr lang="de-DE" sz="2000" dirty="0"/>
-              <a:t>Linear angetriebener Motor über Arduino gesteuert (fungiert als Türbolzen)</a:t>
-            </a:r>
-          </a:p>
-          <a:p>
-            <a:r>
-              <a:rPr lang="de-CH" sz="2000" dirty="0"/>
-              <a:t>Webapp zum öffnen und schliessen der Türen</a:t>
-            </a:r>
-          </a:p>
-          <a:p>
-            <a:r>
-              <a:rPr lang="de-CH" sz="2000" dirty="0"/>
-              <a:t>Fingerprintsensor um das Türschloss Vorort zu bedienen</a:t>
-            </a:r>
-          </a:p>
-          <a:p>
-            <a:r>
-              <a:rPr lang="de-CH" sz="2000" dirty="0"/>
-              <a:t>Status und Access Location wird geloggt und angezeigt</a:t>
-            </a:r>
-          </a:p>
-          <a:p>
-            <a:endParaRPr lang="de-CH" sz="2000" dirty="0"/>
-          </a:p>
-          <a:p>
-            <a:r>
-              <a:rPr lang="de-CH" sz="2000" dirty="0"/>
-              <a:t>Türschloss selber gebaut mit Komponenten aus 3D Drucker</a:t>
-            </a:r>
-          </a:p>
-          <a:p>
-            <a:endParaRPr lang="de-CH" sz="1400" dirty="0"/>
           </a:p>
         </p:txBody>
       </p:sp>
@@ -4554,15 +4936,86 @@
           <p:nvPr/>
         </p:nvPicPr>
         <p:blipFill>
-          <a:blip r:embed="rId2"/>
+          <a:blip r:embed="rId3"/>
           <a:stretch>
             <a:fillRect/>
           </a:stretch>
         </p:blipFill>
         <p:spPr>
           <a:xfrm>
-            <a:off x="10153648" y="1805077"/>
-            <a:ext cx="1665961" cy="4845277"/>
+            <a:off x="10380947" y="1588224"/>
+            <a:ext cx="1811053" cy="5267261"/>
+          </a:xfrm>
+          <a:prstGeom prst="rect">
+            <a:avLst/>
+          </a:prstGeom>
+        </p:spPr>
+      </p:pic>
+      <p:pic>
+        <p:nvPicPr>
+          <p:cNvPr id="11" name="Inhaltsplatzhalter 4">
+            <a:extLst>
+              <a:ext uri="{FF2B5EF4-FFF2-40B4-BE49-F238E27FC236}">
+                <a16:creationId xmlns:a16="http://schemas.microsoft.com/office/drawing/2014/main" id="{931141ED-5320-4B23-B5DB-7E22CFD87579}"/>
+              </a:ext>
+            </a:extLst>
+          </p:cNvPr>
+          <p:cNvPicPr>
+            <a:picLocks noGrp="1" noChangeAspect="1"/>
+          </p:cNvPicPr>
+          <p:nvPr>
+            <p:ph idx="1"/>
+          </p:nvPr>
+        </p:nvPicPr>
+        <p:blipFill>
+          <a:blip r:embed="rId4">
+            <a:extLst>
+              <a:ext uri="{28A0092B-C50C-407E-A947-70E740481C1C}">
+                <a14:useLocalDpi xmlns:a14="http://schemas.microsoft.com/office/drawing/2010/main" val="0"/>
+              </a:ext>
+            </a:extLst>
+          </a:blip>
+          <a:stretch>
+            <a:fillRect/>
+          </a:stretch>
+        </p:blipFill>
+        <p:spPr>
+          <a:xfrm>
+            <a:off x="459350" y="1994461"/>
+            <a:ext cx="4052137" cy="4443948"/>
+          </a:xfrm>
+        </p:spPr>
+      </p:pic>
+      <p:pic>
+        <p:nvPicPr>
+          <p:cNvPr id="5" name="Grafik 4">
+            <a:extLst>
+              <a:ext uri="{FF2B5EF4-FFF2-40B4-BE49-F238E27FC236}">
+                <a16:creationId xmlns:a16="http://schemas.microsoft.com/office/drawing/2014/main" id="{BD4FCD9A-9E6A-415B-8C71-99886A8D444D}"/>
+              </a:ext>
+            </a:extLst>
+          </p:cNvPr>
+          <p:cNvPicPr>
+            <a:picLocks noChangeAspect="1"/>
+          </p:cNvPicPr>
+          <p:nvPr/>
+        </p:nvPicPr>
+        <p:blipFill>
+          <a:blip r:embed="rId5">
+            <a:extLst>
+              <a:ext uri="{28A0092B-C50C-407E-A947-70E740481C1C}">
+                <a14:useLocalDpi xmlns:a14="http://schemas.microsoft.com/office/drawing/2010/main" val="0"/>
+              </a:ext>
+            </a:extLst>
+          </a:blip>
+          <a:stretch>
+            <a:fillRect/>
+          </a:stretch>
+        </p:blipFill>
+        <p:spPr>
+          <a:xfrm>
+            <a:off x="5048761" y="1586627"/>
+            <a:ext cx="5332186" cy="5268797"/>
           </a:xfrm>
           <a:prstGeom prst="rect">
             <a:avLst/>
@@ -4988,7 +5441,7 @@
           <p:cNvPr id="2" name="Titel 1">
             <a:extLst>
               <a:ext uri="{FF2B5EF4-FFF2-40B4-BE49-F238E27FC236}">
-                <a16:creationId xmlns:a16="http://schemas.microsoft.com/office/drawing/2014/main" id="{8D1379B4-8BC0-4BE4-8CDE-53998575785A}"/>
+                <a16:creationId xmlns:a16="http://schemas.microsoft.com/office/drawing/2014/main" id="{8A279065-A709-4BCE-945B-020084CD0E04}"/>
               </a:ext>
             </a:extLst>
           </p:cNvPr>
@@ -5012,14 +5465,14 @@
           <a:lstStyle/>
           <a:p>
             <a:r>
-              <a:rPr lang="de-DE" sz="4000" dirty="0">
+              <a:rPr lang="de-DE" sz="4000">
                 <a:solidFill>
                   <a:srgbClr val="FFFFFF"/>
                 </a:solidFill>
               </a:rPr>
-              <a:t>Use Case</a:t>
-            </a:r>
-            <a:endParaRPr lang="de-CH" sz="4000" dirty="0">
+              <a:t>Reference Model</a:t>
+            </a:r>
+            <a:endParaRPr lang="de-CH" sz="4000">
               <a:solidFill>
                 <a:srgbClr val="FFFFFF"/>
               </a:solidFill>
@@ -5029,10 +5482,10 @@
       </p:sp>
       <p:pic>
         <p:nvPicPr>
-          <p:cNvPr id="5" name="Inhaltsplatzhalter 4">
-            <a:extLst>
-              <a:ext uri="{FF2B5EF4-FFF2-40B4-BE49-F238E27FC236}">
-                <a16:creationId xmlns:a16="http://schemas.microsoft.com/office/drawing/2014/main" id="{C538FC05-3098-4589-B953-CF042D249826}"/>
+          <p:cNvPr id="7" name="Inhaltsplatzhalter 6">
+            <a:extLst>
+              <a:ext uri="{FF2B5EF4-FFF2-40B4-BE49-F238E27FC236}">
+                <a16:creationId xmlns:a16="http://schemas.microsoft.com/office/drawing/2014/main" id="{E8929F48-2509-4419-A338-CB5BE2109F7A}"/>
               </a:ext>
             </a:extLst>
           </p:cNvPr>
@@ -5057,15 +5510,51 @@
         </p:blipFill>
         <p:spPr>
           <a:xfrm>
-            <a:off x="2914649" y="1703449"/>
-            <a:ext cx="4581525" cy="5024523"/>
+            <a:off x="2525902" y="1885279"/>
+            <a:ext cx="7608698" cy="4794279"/>
           </a:xfrm>
+        </p:spPr>
+      </p:pic>
+      <p:pic>
+        <p:nvPicPr>
+          <p:cNvPr id="5" name="Grafik 4">
+            <a:extLst>
+              <a:ext uri="{FF2B5EF4-FFF2-40B4-BE49-F238E27FC236}">
+                <a16:creationId xmlns:a16="http://schemas.microsoft.com/office/drawing/2014/main" id="{EC188D83-3101-4566-B033-6B34543F2714}"/>
+              </a:ext>
+            </a:extLst>
+          </p:cNvPr>
+          <p:cNvPicPr>
+            <a:picLocks noChangeAspect="1"/>
+          </p:cNvPicPr>
+          <p:nvPr/>
+        </p:nvPicPr>
+        <p:blipFill>
+          <a:blip r:embed="rId3">
+            <a:extLst>
+              <a:ext uri="{28A0092B-C50C-407E-A947-70E740481C1C}">
+                <a14:useLocalDpi xmlns:a14="http://schemas.microsoft.com/office/drawing/2010/main" val="0"/>
+              </a:ext>
+            </a:extLst>
+          </a:blip>
+          <a:stretch>
+            <a:fillRect/>
+          </a:stretch>
+        </p:blipFill>
+        <p:spPr>
+          <a:xfrm>
+            <a:off x="1852610" y="1590741"/>
+            <a:ext cx="8486775" cy="5143500"/>
+          </a:xfrm>
+          <a:prstGeom prst="rect">
+            <a:avLst/>
+          </a:prstGeom>
         </p:spPr>
       </p:pic>
     </p:spTree>
     <p:extLst>
       <p:ext uri="{BB962C8B-B14F-4D97-AF65-F5344CB8AC3E}">
-        <p14:creationId xmlns:p14="http://schemas.microsoft.com/office/powerpoint/2010/main" val="2514133550"/>
+        <p14:creationId xmlns:p14="http://schemas.microsoft.com/office/powerpoint/2010/main" val="2820225358"/>
       </p:ext>
     </p:extLst>
   </p:cSld>
@@ -5481,7 +5970,7 @@
           <p:cNvPr id="2" name="Titel 1">
             <a:extLst>
               <a:ext uri="{FF2B5EF4-FFF2-40B4-BE49-F238E27FC236}">
-                <a16:creationId xmlns:a16="http://schemas.microsoft.com/office/drawing/2014/main" id="{8A279065-A709-4BCE-945B-020084CD0E04}"/>
+                <a16:creationId xmlns:a16="http://schemas.microsoft.com/office/drawing/2014/main" id="{C4215FBD-9495-41D6-9D63-5CB76F8E4336}"/>
               </a:ext>
             </a:extLst>
           </p:cNvPr>
@@ -5510,7 +5999,7 @@
                   <a:srgbClr val="FFFFFF"/>
                 </a:solidFill>
               </a:rPr>
-              <a:t>Reference Model</a:t>
+              <a:t>Interface Docs</a:t>
             </a:r>
             <a:endParaRPr lang="de-CH" sz="4000">
               <a:solidFill>
@@ -5520,71 +6009,208 @@
           </a:p>
         </p:txBody>
       </p:sp>
+      <p:sp>
+        <p:nvSpPr>
+          <p:cNvPr id="6" name="Inhaltsplatzhalter 5">
+            <a:extLst>
+              <a:ext uri="{FF2B5EF4-FFF2-40B4-BE49-F238E27FC236}">
+                <a16:creationId xmlns:a16="http://schemas.microsoft.com/office/drawing/2014/main" id="{0EA0F595-E8AF-4F19-ACF4-155FE53B433E}"/>
+              </a:ext>
+            </a:extLst>
+          </p:cNvPr>
+          <p:cNvSpPr>
+            <a:spLocks noGrp="1"/>
+          </p:cNvSpPr>
+          <p:nvPr>
+            <p:ph idx="1"/>
+          </p:nvPr>
+        </p:nvSpPr>
+        <p:spPr/>
+        <p:txBody>
+          <a:bodyPr>
+            <a:normAutofit lnSpcReduction="10000"/>
+          </a:bodyPr>
+          <a:lstStyle/>
+          <a:p>
+            <a:pPr>
+              <a:buFontTx/>
+              <a:buChar char="-"/>
+            </a:pPr>
+            <a:r>
+              <a:rPr lang="de-CH" sz="2400" dirty="0"/>
+              <a:t>Backend API</a:t>
+            </a:r>
+          </a:p>
+          <a:p>
+            <a:pPr marL="0" indent="0">
+              <a:buNone/>
+            </a:pPr>
+            <a:endParaRPr lang="de-CH" sz="2400" dirty="0"/>
+          </a:p>
+          <a:p>
+            <a:pPr marL="0" indent="0">
+              <a:buNone/>
+            </a:pPr>
+            <a:endParaRPr lang="de-CH" sz="2400" dirty="0"/>
+          </a:p>
+          <a:p>
+            <a:pPr>
+              <a:buFontTx/>
+              <a:buChar char="-"/>
+            </a:pPr>
+            <a:endParaRPr lang="de-CH" sz="2400" dirty="0"/>
+          </a:p>
+          <a:p>
+            <a:pPr>
+              <a:buFontTx/>
+              <a:buChar char="-"/>
+            </a:pPr>
+            <a:endParaRPr lang="de-CH" sz="2400" dirty="0"/>
+          </a:p>
+          <a:p>
+            <a:pPr>
+              <a:buFontTx/>
+              <a:buChar char="-"/>
+            </a:pPr>
+            <a:endParaRPr lang="de-CH" sz="2400" dirty="0"/>
+          </a:p>
+          <a:p>
+            <a:endParaRPr lang="de-CH" dirty="0"/>
+          </a:p>
+          <a:p>
+            <a:pPr marL="0" indent="0">
+              <a:buNone/>
+            </a:pPr>
+            <a:endParaRPr lang="de-CH" sz="2400" dirty="0"/>
+          </a:p>
+          <a:p>
+            <a:pPr>
+              <a:buFontTx/>
+              <a:buChar char="-"/>
+            </a:pPr>
+            <a:r>
+              <a:rPr lang="de-CH" sz="2400" dirty="0"/>
+              <a:t>Serial USB </a:t>
+            </a:r>
+          </a:p>
+          <a:p>
+            <a:pPr lvl="1">
+              <a:buFontTx/>
+              <a:buChar char="-"/>
+            </a:pPr>
+            <a:r>
+              <a:rPr lang="de-CH" sz="1400" dirty="0"/>
+              <a:t>(</a:t>
+            </a:r>
+            <a:r>
+              <a:rPr lang="de-CH" sz="1400" dirty="0" err="1"/>
+              <a:t>npm</a:t>
+            </a:r>
+            <a:r>
+              <a:rPr lang="de-CH" sz="1400" dirty="0"/>
+              <a:t> </a:t>
+            </a:r>
+            <a:r>
+              <a:rPr lang="de-CH" sz="1400" dirty="0" err="1"/>
+              <a:t>packagename</a:t>
+            </a:r>
+            <a:r>
+              <a:rPr lang="de-CH" sz="1400" dirty="0"/>
+              <a:t>: @serialport, </a:t>
+            </a:r>
+            <a:r>
+              <a:rPr lang="de-CH" sz="1400" dirty="0" err="1"/>
+              <a:t>portName</a:t>
+            </a:r>
+            <a:r>
+              <a:rPr lang="de-CH" sz="1400" dirty="0"/>
+              <a:t>:/</a:t>
+            </a:r>
+            <a:r>
+              <a:rPr lang="de-CH" sz="1400" dirty="0" err="1"/>
+              <a:t>dev</a:t>
+            </a:r>
+            <a:r>
+              <a:rPr lang="de-CH" sz="1400" dirty="0"/>
+              <a:t>/ttyUSB0, baudRate:9600, dataBits:8, stopBits:1)</a:t>
+            </a:r>
+          </a:p>
+          <a:p>
+            <a:pPr marL="0" indent="0">
+              <a:buNone/>
+            </a:pPr>
+            <a:endParaRPr lang="de-CH" dirty="0"/>
+          </a:p>
+          <a:p>
+            <a:endParaRPr lang="en-GB" dirty="0"/>
+          </a:p>
+        </p:txBody>
+      </p:sp>
+      <p:sp>
+        <p:nvSpPr>
+          <p:cNvPr id="11" name="Textfeld 10">
+            <a:extLst>
+              <a:ext uri="{FF2B5EF4-FFF2-40B4-BE49-F238E27FC236}">
+                <a16:creationId xmlns:a16="http://schemas.microsoft.com/office/drawing/2014/main" id="{E12872DE-A2D7-40CA-BF36-75524F8A999C}"/>
+              </a:ext>
+            </a:extLst>
+          </p:cNvPr>
+          <p:cNvSpPr txBox="1"/>
+          <p:nvPr/>
+        </p:nvSpPr>
+        <p:spPr>
+          <a:xfrm>
+            <a:off x="2811429" y="1818146"/>
+            <a:ext cx="6095128" cy="369332"/>
+          </a:xfrm>
+          <a:prstGeom prst="rect">
+            <a:avLst/>
+          </a:prstGeom>
+          <a:noFill/>
+        </p:spPr>
+        <p:txBody>
+          <a:bodyPr wrap="square">
+            <a:spAutoFit/>
+          </a:bodyPr>
+          <a:lstStyle/>
+          <a:p>
+            <a:r>
+              <a:rPr lang="en-GB" dirty="0">
+                <a:hlinkClick r:id="rId2"/>
+              </a:rPr>
+              <a:t>https://3to5.ch:4001/api/docs</a:t>
+            </a:r>
+            <a:r>
+              <a:rPr lang="en-GB" dirty="0"/>
+              <a:t>  (only over VPN) </a:t>
+            </a:r>
+          </a:p>
+        </p:txBody>
+      </p:sp>
       <p:pic>
         <p:nvPicPr>
-          <p:cNvPr id="7" name="Inhaltsplatzhalter 6">
-            <a:extLst>
-              <a:ext uri="{FF2B5EF4-FFF2-40B4-BE49-F238E27FC236}">
-                <a16:creationId xmlns:a16="http://schemas.microsoft.com/office/drawing/2014/main" id="{E8929F48-2509-4419-A338-CB5BE2109F7A}"/>
+          <p:cNvPr id="9" name="Grafik 8">
+            <a:extLst>
+              <a:ext uri="{FF2B5EF4-FFF2-40B4-BE49-F238E27FC236}">
+                <a16:creationId xmlns:a16="http://schemas.microsoft.com/office/drawing/2014/main" id="{5941EB97-4C22-4245-889B-849121B6D189}"/>
               </a:ext>
             </a:extLst>
           </p:cNvPr>
           <p:cNvPicPr>
-            <a:picLocks noGrp="1" noChangeAspect="1"/>
+            <a:picLocks noChangeAspect="1"/>
           </p:cNvPicPr>
-          <p:nvPr>
-            <p:ph idx="1"/>
-          </p:nvPr>
+          <p:nvPr/>
         </p:nvPicPr>
         <p:blipFill>
-          <a:blip r:embed="rId2">
-            <a:extLst>
-              <a:ext uri="{28A0092B-C50C-407E-A947-70E740481C1C}">
-                <a14:useLocalDpi xmlns:a14="http://schemas.microsoft.com/office/drawing/2010/main" val="0"/>
-              </a:ext>
-            </a:extLst>
-          </a:blip>
+          <a:blip r:embed="rId3"/>
           <a:stretch>
             <a:fillRect/>
           </a:stretch>
         </p:blipFill>
         <p:spPr>
           <a:xfrm>
-            <a:off x="2525902" y="1885279"/>
-            <a:ext cx="7608698" cy="4794279"/>
-          </a:xfrm>
-        </p:spPr>
-      </p:pic>
-      <p:pic>
-        <p:nvPicPr>
-          <p:cNvPr id="5" name="Grafik 4">
-            <a:extLst>
-              <a:ext uri="{FF2B5EF4-FFF2-40B4-BE49-F238E27FC236}">
-                <a16:creationId xmlns:a16="http://schemas.microsoft.com/office/drawing/2014/main" id="{EC188D83-3101-4566-B033-6B34543F2714}"/>
-              </a:ext>
-            </a:extLst>
-          </p:cNvPr>
-          <p:cNvPicPr>
-            <a:picLocks noChangeAspect="1"/>
-          </p:cNvPicPr>
-          <p:nvPr/>
-        </p:nvPicPr>
-        <p:blipFill>
-          <a:blip r:embed="rId3">
-            <a:extLst>
-              <a:ext uri="{28A0092B-C50C-407E-A947-70E740481C1C}">
-                <a14:useLocalDpi xmlns:a14="http://schemas.microsoft.com/office/drawing/2010/main" val="0"/>
-              </a:ext>
-            </a:extLst>
-          </a:blip>
-          <a:stretch>
-            <a:fillRect/>
-          </a:stretch>
-        </p:blipFill>
-        <p:spPr>
-          <a:xfrm>
-            <a:off x="1852610" y="1590741"/>
-            <a:ext cx="8486775" cy="5143500"/>
+            <a:off x="1106370" y="2408192"/>
+            <a:ext cx="9979255" cy="2480525"/>
           </a:xfrm>
           <a:prstGeom prst="rect">
             <a:avLst/>
@@ -5594,7 +6220,7 @@
     </p:spTree>
     <p:extLst>
       <p:ext uri="{BB962C8B-B14F-4D97-AF65-F5344CB8AC3E}">
-        <p14:creationId xmlns:p14="http://schemas.microsoft.com/office/powerpoint/2010/main" val="2820225358"/>
+        <p14:creationId xmlns:p14="http://schemas.microsoft.com/office/powerpoint/2010/main" val="2764945644"/>
       </p:ext>
     </p:extLst>
   </p:cSld>
@@ -6010,7 +6636,7 @@
           <p:cNvPr id="2" name="Titel 1">
             <a:extLst>
               <a:ext uri="{FF2B5EF4-FFF2-40B4-BE49-F238E27FC236}">
-                <a16:creationId xmlns:a16="http://schemas.microsoft.com/office/drawing/2014/main" id="{8A279065-A709-4BCE-945B-020084CD0E04}"/>
+                <a16:creationId xmlns:a16="http://schemas.microsoft.com/office/drawing/2014/main" id="{D7415D3F-1E15-4E59-BF76-33DA9EEB2E54}"/>
               </a:ext>
             </a:extLst>
           </p:cNvPr>
@@ -6039,7 +6665,7 @@
                   <a:srgbClr val="FFFFFF"/>
                 </a:solidFill>
               </a:rPr>
-              <a:t>Sequenzdiagramm</a:t>
+              <a:t>Issues und Herausforderungen</a:t>
             </a:r>
             <a:endParaRPr lang="de-CH" sz="4000">
               <a:solidFill>
@@ -6049,45 +6675,140 @@
           </a:p>
         </p:txBody>
       </p:sp>
-      <p:pic>
-        <p:nvPicPr>
-          <p:cNvPr id="15" name="Inhaltsplatzhalter 14">
-            <a:extLst>
-              <a:ext uri="{FF2B5EF4-FFF2-40B4-BE49-F238E27FC236}">
-                <a16:creationId xmlns:a16="http://schemas.microsoft.com/office/drawing/2014/main" id="{9D32FBAC-54A0-4546-9340-21087273FF34}"/>
-              </a:ext>
-            </a:extLst>
-          </p:cNvPr>
-          <p:cNvPicPr>
-            <a:picLocks noGrp="1" noChangeAspect="1"/>
-          </p:cNvPicPr>
+      <p:sp>
+        <p:nvSpPr>
+          <p:cNvPr id="5" name="Inhaltsplatzhalter 4">
+            <a:extLst>
+              <a:ext uri="{FF2B5EF4-FFF2-40B4-BE49-F238E27FC236}">
+                <a16:creationId xmlns:a16="http://schemas.microsoft.com/office/drawing/2014/main" id="{4126DD72-7EE1-421E-9B86-F13E74DCB0A3}"/>
+              </a:ext>
+            </a:extLst>
+          </p:cNvPr>
+          <p:cNvSpPr>
+            <a:spLocks noGrp="1"/>
+          </p:cNvSpPr>
           <p:nvPr>
             <p:ph idx="1"/>
           </p:nvPr>
-        </p:nvPicPr>
-        <p:blipFill>
-          <a:blip r:embed="rId2">
-            <a:extLst>
-              <a:ext uri="{28A0092B-C50C-407E-A947-70E740481C1C}">
-                <a14:useLocalDpi xmlns:a14="http://schemas.microsoft.com/office/drawing/2010/main" val="0"/>
-              </a:ext>
-            </a:extLst>
-          </a:blip>
-          <a:stretch>
-            <a:fillRect/>
-          </a:stretch>
-        </p:blipFill>
-        <p:spPr>
-          <a:xfrm>
-            <a:off x="1137138" y="2091531"/>
-            <a:ext cx="8916499" cy="4302667"/>
-          </a:xfrm>
-        </p:spPr>
-      </p:pic>
+        </p:nvSpPr>
+        <p:spPr/>
+        <p:txBody>
+          <a:bodyPr>
+            <a:normAutofit/>
+          </a:bodyPr>
+          <a:lstStyle/>
+          <a:p>
+            <a:endParaRPr lang="de-CH" dirty="0"/>
+          </a:p>
+          <a:p>
+            <a:r>
+              <a:rPr lang="de-CH" sz="2000" dirty="0"/>
+              <a:t>Wie kann die Lösung abgesichert werden</a:t>
+            </a:r>
+          </a:p>
+          <a:p>
+            <a:pPr lvl="1"/>
+            <a:r>
+              <a:rPr lang="de-CH" sz="2000" dirty="0" err="1"/>
+              <a:t>ZerotrustVPN</a:t>
+            </a:r>
+            <a:r>
+              <a:rPr lang="de-CH" sz="2000" dirty="0"/>
+              <a:t>, </a:t>
+            </a:r>
+            <a:r>
+              <a:rPr lang="de-CH" sz="2000" dirty="0" err="1"/>
+              <a:t>DoorControl</a:t>
+            </a:r>
+            <a:r>
+              <a:rPr lang="de-CH" sz="2000" dirty="0"/>
+              <a:t> nur möglich wenn GPS aktiviert ist</a:t>
+            </a:r>
+          </a:p>
+          <a:p>
+            <a:pPr lvl="1"/>
+            <a:r>
+              <a:rPr lang="de-CH" sz="2000" dirty="0"/>
+              <a:t>SSL für alle Endpunkte</a:t>
+            </a:r>
+          </a:p>
+          <a:p>
+            <a:pPr lvl="1"/>
+            <a:endParaRPr lang="de-CH" sz="2000" dirty="0"/>
+          </a:p>
+          <a:p>
+            <a:r>
+              <a:rPr lang="de-CH" sz="2000" dirty="0"/>
+              <a:t>Türstatus (Bolzenstatus) </a:t>
+            </a:r>
+            <a:r>
+              <a:rPr lang="de-CH" sz="2000" dirty="0" err="1"/>
+              <a:t>sync</a:t>
+            </a:r>
+            <a:endParaRPr lang="de-CH" sz="2000" dirty="0"/>
+          </a:p>
+          <a:p>
+            <a:pPr lvl="1"/>
+            <a:r>
+              <a:rPr lang="de-CH" sz="1600" dirty="0" err="1"/>
+              <a:t>Endstops</a:t>
+            </a:r>
+            <a:r>
+              <a:rPr lang="de-CH" sz="1600" dirty="0"/>
+              <a:t> (optisch)</a:t>
+            </a:r>
+          </a:p>
+          <a:p>
+            <a:pPr lvl="1"/>
+            <a:r>
+              <a:rPr lang="de-CH" sz="1600" dirty="0"/>
+              <a:t>Alles verkabeln</a:t>
+            </a:r>
+          </a:p>
+          <a:p>
+            <a:pPr marL="457200" lvl="1" indent="0">
+              <a:buNone/>
+            </a:pPr>
+            <a:endParaRPr lang="de-CH" sz="1600" dirty="0"/>
+          </a:p>
+          <a:p>
+            <a:r>
+              <a:rPr lang="de-CH" sz="2000" dirty="0" err="1"/>
+              <a:t>Let’s</a:t>
+            </a:r>
+            <a:r>
+              <a:rPr lang="de-CH" sz="2000" dirty="0"/>
+              <a:t> </a:t>
+            </a:r>
+            <a:r>
+              <a:rPr lang="de-CH" sz="2000" dirty="0" err="1"/>
+              <a:t>encrypt</a:t>
+            </a:r>
+            <a:r>
+              <a:rPr lang="de-CH" sz="2000" dirty="0"/>
+              <a:t> SSL-Zertifikate für privaten IP-range (e.g. Zerotrust VPN)</a:t>
+            </a:r>
+          </a:p>
+          <a:p>
+            <a:pPr lvl="1"/>
+            <a:endParaRPr lang="de-CH" sz="2000" dirty="0"/>
+          </a:p>
+          <a:p>
+            <a:pPr lvl="1"/>
+            <a:endParaRPr lang="de-CH" sz="2000" dirty="0"/>
+          </a:p>
+          <a:p>
+            <a:endParaRPr lang="de-CH" dirty="0"/>
+          </a:p>
+          <a:p>
+            <a:endParaRPr lang="en-GB" dirty="0"/>
+          </a:p>
+        </p:txBody>
+      </p:sp>
     </p:spTree>
     <p:extLst>
       <p:ext uri="{BB962C8B-B14F-4D97-AF65-F5344CB8AC3E}">
-        <p14:creationId xmlns:p14="http://schemas.microsoft.com/office/powerpoint/2010/main" val="1040013514"/>
+        <p14:creationId xmlns:p14="http://schemas.microsoft.com/office/powerpoint/2010/main" val="3463889109"/>
       </p:ext>
     </p:extLst>
   </p:cSld>
@@ -6503,7 +7224,7 @@
           <p:cNvPr id="2" name="Titel 1">
             <a:extLst>
               <a:ext uri="{FF2B5EF4-FFF2-40B4-BE49-F238E27FC236}">
-                <a16:creationId xmlns:a16="http://schemas.microsoft.com/office/drawing/2014/main" id="{C4215FBD-9495-41D6-9D63-5CB76F8E4336}"/>
+                <a16:creationId xmlns:a16="http://schemas.microsoft.com/office/drawing/2014/main" id="{0E50BAD0-0946-44F5-BA6B-73A80B6BD197}"/>
               </a:ext>
             </a:extLst>
           </p:cNvPr>
@@ -6532,7 +7253,7 @@
                   <a:srgbClr val="FFFFFF"/>
                 </a:solidFill>
               </a:rPr>
-              <a:t>Interface Docs</a:t>
+              <a:t>Demo</a:t>
             </a:r>
             <a:endParaRPr lang="de-CH" sz="4000">
               <a:solidFill>
@@ -6542,1888 +7263,120 @@
           </a:p>
         </p:txBody>
       </p:sp>
-      <p:sp>
-        <p:nvSpPr>
-          <p:cNvPr id="6" name="Inhaltsplatzhalter 5">
-            <a:extLst>
-              <a:ext uri="{FF2B5EF4-FFF2-40B4-BE49-F238E27FC236}">
-                <a16:creationId xmlns:a16="http://schemas.microsoft.com/office/drawing/2014/main" id="{0EA0F595-E8AF-4F19-ACF4-155FE53B433E}"/>
-              </a:ext>
-            </a:extLst>
-          </p:cNvPr>
-          <p:cNvSpPr>
-            <a:spLocks noGrp="1"/>
-          </p:cNvSpPr>
+      <p:pic>
+        <p:nvPicPr>
+          <p:cNvPr id="5" name="Inhaltsplatzhalter 4" descr="Ein Bild, das drinnen enthält.&#10;&#10;Automatisch generierte Beschreibung">
+            <a:extLst>
+              <a:ext uri="{FF2B5EF4-FFF2-40B4-BE49-F238E27FC236}">
+                <a16:creationId xmlns:a16="http://schemas.microsoft.com/office/drawing/2014/main" id="{0DD6D9A3-97DD-4C3E-8F0D-C2AEF88AA49F}"/>
+              </a:ext>
+            </a:extLst>
+          </p:cNvPr>
+          <p:cNvPicPr>
+            <a:picLocks noGrp="1" noChangeAspect="1"/>
+          </p:cNvPicPr>
           <p:nvPr>
             <p:ph idx="1"/>
           </p:nvPr>
-        </p:nvSpPr>
-        <p:spPr/>
-        <p:txBody>
-          <a:bodyPr>
-            <a:normAutofit/>
-          </a:bodyPr>
-          <a:lstStyle/>
-          <a:p>
-            <a:pPr>
-              <a:buFontTx/>
-              <a:buChar char="-"/>
-            </a:pPr>
-            <a:r>
-              <a:rPr lang="de-CH" sz="2400"/>
-              <a:t>Backend API</a:t>
-            </a:r>
-          </a:p>
-          <a:p>
-            <a:endParaRPr lang="de-CH"/>
-          </a:p>
-          <a:p>
-            <a:endParaRPr lang="de-CH"/>
-          </a:p>
-          <a:p>
-            <a:endParaRPr lang="de-CH"/>
-          </a:p>
-          <a:p>
-            <a:endParaRPr lang="de-CH"/>
-          </a:p>
-          <a:p>
-            <a:endParaRPr lang="de-CH"/>
-          </a:p>
-          <a:p>
-            <a:pPr marL="0" indent="0">
-              <a:buNone/>
-            </a:pPr>
-            <a:endParaRPr lang="de-CH" sz="2400"/>
-          </a:p>
-          <a:p>
-            <a:pPr>
-              <a:buFontTx/>
-              <a:buChar char="-"/>
-            </a:pPr>
-            <a:r>
-              <a:rPr lang="de-CH" sz="2400"/>
-              <a:t>Serial USB </a:t>
-            </a:r>
-          </a:p>
-          <a:p>
-            <a:pPr lvl="1">
-              <a:buFontTx/>
-              <a:buChar char="-"/>
-            </a:pPr>
-            <a:r>
-              <a:rPr lang="de-CH" sz="1400"/>
-              <a:t>(</a:t>
-            </a:r>
-            <a:r>
-              <a:rPr lang="de-CH" sz="1400" err="1"/>
-              <a:t>npm</a:t>
-            </a:r>
-            <a:r>
-              <a:rPr lang="de-CH" sz="1400"/>
-              <a:t> </a:t>
-            </a:r>
-            <a:r>
-              <a:rPr lang="de-CH" sz="1400" err="1"/>
-              <a:t>packagename</a:t>
-            </a:r>
-            <a:r>
-              <a:rPr lang="de-CH" sz="1400"/>
-              <a:t>: @serialport, </a:t>
-            </a:r>
-            <a:r>
-              <a:rPr lang="de-CH" sz="1400" err="1"/>
-              <a:t>portName</a:t>
-            </a:r>
-            <a:r>
-              <a:rPr lang="de-CH" sz="1400"/>
-              <a:t>:/</a:t>
-            </a:r>
-            <a:r>
-              <a:rPr lang="de-CH" sz="1400" err="1"/>
-              <a:t>dev</a:t>
-            </a:r>
-            <a:r>
-              <a:rPr lang="de-CH" sz="1400"/>
-              <a:t>/ttyUSB0, baudRate:9600, dataBits:8, stopBits:1)</a:t>
-            </a:r>
-          </a:p>
-          <a:p>
-            <a:pPr marL="0" indent="0">
-              <a:buNone/>
-            </a:pPr>
-            <a:endParaRPr lang="de-CH"/>
-          </a:p>
-          <a:p>
-            <a:endParaRPr lang="en-GB"/>
-          </a:p>
-        </p:txBody>
-      </p:sp>
-      <p:graphicFrame>
-        <p:nvGraphicFramePr>
-          <p:cNvPr id="13" name="Tabelle 4">
-            <a:extLst>
-              <a:ext uri="{FF2B5EF4-FFF2-40B4-BE49-F238E27FC236}">
-                <a16:creationId xmlns:a16="http://schemas.microsoft.com/office/drawing/2014/main" id="{CD6AE917-80B6-4630-B301-B9D4E6A15059}"/>
-              </a:ext>
-            </a:extLst>
-          </p:cNvPr>
-          <p:cNvGraphicFramePr>
-            <a:graphicFrameLocks/>
-          </p:cNvGraphicFramePr>
-          <p:nvPr>
-            <p:extLst>
-              <p:ext uri="{D42A27DB-BD31-4B8C-83A1-F6EECF244321}">
-                <p14:modId xmlns:p14="http://schemas.microsoft.com/office/powerpoint/2010/main" val="3261430014"/>
-              </p:ext>
-            </p:extLst>
-          </p:nvPr>
-        </p:nvGraphicFramePr>
-        <p:xfrm>
-          <a:off x="838199" y="2299370"/>
-          <a:ext cx="10515598" cy="2595880"/>
-        </p:xfrm>
-        <a:graphic>
-          <a:graphicData uri="http://schemas.openxmlformats.org/drawingml/2006/table">
-            <a:tbl>
-              <a:tblPr firstRow="1" bandRow="1">
-                <a:tableStyleId>{5C22544A-7EE6-4342-B048-85BDC9FD1C3A}</a:tableStyleId>
-              </a:tblPr>
-              <a:tblGrid>
-                <a:gridCol w="1111862">
-                  <a:extLst>
-                    <a:ext uri="{9D8B030D-6E8A-4147-A177-3AD203B41FA5}">
-                      <a16:colId xmlns:a16="http://schemas.microsoft.com/office/drawing/2014/main" val="937569626"/>
-                    </a:ext>
-                  </a:extLst>
-                </a:gridCol>
-                <a:gridCol w="1111862">
-                  <a:extLst>
-                    <a:ext uri="{9D8B030D-6E8A-4147-A177-3AD203B41FA5}">
-                      <a16:colId xmlns:a16="http://schemas.microsoft.com/office/drawing/2014/main" val="969278442"/>
-                    </a:ext>
-                  </a:extLst>
-                </a:gridCol>
-                <a:gridCol w="2329875">
-                  <a:extLst>
-                    <a:ext uri="{9D8B030D-6E8A-4147-A177-3AD203B41FA5}">
-                      <a16:colId xmlns:a16="http://schemas.microsoft.com/office/drawing/2014/main" val="1087873204"/>
-                    </a:ext>
-                  </a:extLst>
-                </a:gridCol>
-                <a:gridCol w="5961999">
-                  <a:extLst>
-                    <a:ext uri="{9D8B030D-6E8A-4147-A177-3AD203B41FA5}">
-                      <a16:colId xmlns:a16="http://schemas.microsoft.com/office/drawing/2014/main" val="390955062"/>
-                    </a:ext>
-                  </a:extLst>
-                </a:gridCol>
-              </a:tblGrid>
-              <a:tr h="370840">
-                <a:tc>
-                  <a:txBody>
-                    <a:bodyPr/>
-                    <a:lstStyle/>
-                    <a:p>
-                      <a:r>
-                        <a:rPr lang="de-CH"/>
-                        <a:t>HOST</a:t>
-                      </a:r>
-                      <a:endParaRPr lang="en-GB"/>
-                    </a:p>
-                  </a:txBody>
-                  <a:tcPr/>
-                </a:tc>
-                <a:tc>
-                  <a:txBody>
-                    <a:bodyPr/>
-                    <a:lstStyle/>
-                    <a:p>
-                      <a:r>
-                        <a:rPr lang="de-CH"/>
-                        <a:t>Verb</a:t>
-                      </a:r>
-                      <a:endParaRPr lang="en-GB"/>
-                    </a:p>
-                  </a:txBody>
-                  <a:tcPr/>
-                </a:tc>
-                <a:tc>
-                  <a:txBody>
-                    <a:bodyPr/>
-                    <a:lstStyle/>
-                    <a:p>
-                      <a:r>
-                        <a:rPr lang="de-CH"/>
-                        <a:t>Ressourcen</a:t>
-                      </a:r>
-                      <a:endParaRPr lang="en-GB"/>
-                    </a:p>
-                  </a:txBody>
-                  <a:tcPr/>
-                </a:tc>
-                <a:tc>
-                  <a:txBody>
-                    <a:bodyPr/>
-                    <a:lstStyle/>
-                    <a:p>
-                      <a:r>
-                        <a:rPr lang="de-CH"/>
-                        <a:t>Description</a:t>
-                      </a:r>
-                      <a:endParaRPr lang="en-GB"/>
-                    </a:p>
-                  </a:txBody>
-                  <a:tcPr/>
-                </a:tc>
-                <a:extLst>
-                  <a:ext uri="{0D108BD9-81ED-4DB2-BD59-A6C34878D82A}">
-                    <a16:rowId xmlns:a16="http://schemas.microsoft.com/office/drawing/2014/main" val="2017315333"/>
-                  </a:ext>
-                </a:extLst>
-              </a:tr>
-              <a:tr h="370840">
-                <a:tc>
-                  <a:txBody>
-                    <a:bodyPr/>
-                    <a:lstStyle/>
-                    <a:p>
-                      <a:r>
-                        <a:rPr lang="de-CH"/>
-                        <a:t>3to5.ch</a:t>
-                      </a:r>
-                      <a:endParaRPr lang="en-GB"/>
-                    </a:p>
-                  </a:txBody>
-                  <a:tcPr/>
-                </a:tc>
-                <a:tc>
-                  <a:txBody>
-                    <a:bodyPr/>
-                    <a:lstStyle/>
-                    <a:p>
-                      <a:r>
-                        <a:rPr lang="de-CH"/>
-                        <a:t>POST</a:t>
-                      </a:r>
-                      <a:endParaRPr lang="en-GB"/>
-                    </a:p>
-                  </a:txBody>
-                  <a:tcPr/>
-                </a:tc>
-                <a:tc>
-                  <a:txBody>
-                    <a:bodyPr/>
-                    <a:lstStyle/>
-                    <a:p>
-                      <a:pPr marL="0" marR="0" lvl="0" indent="0" algn="l" defTabSz="914400" rtl="0" eaLnBrk="1" fontAlgn="auto" latinLnBrk="0" hangingPunct="1">
-                        <a:lnSpc>
-                          <a:spcPct val="100000"/>
-                        </a:lnSpc>
-                        <a:spcBef>
-                          <a:spcPts val="0"/>
-                        </a:spcBef>
-                        <a:spcAft>
-                          <a:spcPts val="0"/>
-                        </a:spcAft>
-                        <a:buClrTx/>
-                        <a:buSzTx/>
-                        <a:buFontTx/>
-                        <a:buNone/>
-                        <a:tabLst/>
-                        <a:defRPr/>
-                      </a:pPr>
-                      <a:r>
-                        <a:rPr lang="en-GB" sz="1800" b="0" kern="1200">
-                          <a:solidFill>
-                            <a:schemeClr val="dk1"/>
-                          </a:solidFill>
-                          <a:effectLst/>
-                          <a:latin typeface="+mn-lt"/>
-                          <a:ea typeface="+mn-ea"/>
-                          <a:cs typeface="+mn-cs"/>
-                        </a:rPr>
-                        <a:t>/api/door</a:t>
-                      </a:r>
-                    </a:p>
-                  </a:txBody>
-                  <a:tcPr/>
-                </a:tc>
-                <a:tc>
-                  <a:txBody>
-                    <a:bodyPr/>
-                    <a:lstStyle/>
-                    <a:p>
-                      <a:r>
-                        <a:rPr lang="de-CH"/>
-                        <a:t>moves door motors</a:t>
-                      </a:r>
-                      <a:endParaRPr lang="en-GB"/>
-                    </a:p>
-                  </a:txBody>
-                  <a:tcPr/>
-                </a:tc>
-                <a:extLst>
-                  <a:ext uri="{0D108BD9-81ED-4DB2-BD59-A6C34878D82A}">
-                    <a16:rowId xmlns:a16="http://schemas.microsoft.com/office/drawing/2014/main" val="391777045"/>
-                  </a:ext>
-                </a:extLst>
-              </a:tr>
-              <a:tr h="370840">
-                <a:tc>
-                  <a:txBody>
-                    <a:bodyPr/>
-                    <a:lstStyle/>
-                    <a:p>
-                      <a:endParaRPr lang="en-GB"/>
-                    </a:p>
-                  </a:txBody>
-                  <a:tcPr/>
-                </a:tc>
-                <a:tc>
-                  <a:txBody>
-                    <a:bodyPr/>
-                    <a:lstStyle/>
-                    <a:p>
-                      <a:r>
-                        <a:rPr lang="de-CH"/>
-                        <a:t>GET</a:t>
-                      </a:r>
-                      <a:endParaRPr lang="en-GB"/>
-                    </a:p>
-                  </a:txBody>
-                  <a:tcPr/>
-                </a:tc>
-                <a:tc>
-                  <a:txBody>
-                    <a:bodyPr/>
-                    <a:lstStyle/>
-                    <a:p>
-                      <a:pPr marL="0" marR="0" lvl="0" indent="0" algn="l" defTabSz="914400" rtl="0" eaLnBrk="1" fontAlgn="auto" latinLnBrk="0" hangingPunct="1">
-                        <a:lnSpc>
-                          <a:spcPct val="100000"/>
-                        </a:lnSpc>
-                        <a:spcBef>
-                          <a:spcPts val="0"/>
-                        </a:spcBef>
-                        <a:spcAft>
-                          <a:spcPts val="0"/>
-                        </a:spcAft>
-                        <a:buClrTx/>
-                        <a:buSzTx/>
-                        <a:buFontTx/>
-                        <a:buNone/>
-                        <a:tabLst/>
-                        <a:defRPr/>
-                      </a:pPr>
-                      <a:r>
-                        <a:rPr lang="en-GB" sz="1800" b="0" kern="1200">
-                          <a:solidFill>
-                            <a:schemeClr val="dk1"/>
-                          </a:solidFill>
-                          <a:effectLst/>
-                          <a:latin typeface="+mn-lt"/>
-                          <a:ea typeface="+mn-ea"/>
-                          <a:cs typeface="+mn-cs"/>
-                        </a:rPr>
-                        <a:t>/api/status</a:t>
-                      </a:r>
-                    </a:p>
-                  </a:txBody>
-                  <a:tcPr/>
-                </a:tc>
-                <a:tc>
-                  <a:txBody>
-                    <a:bodyPr/>
-                    <a:lstStyle/>
-                    <a:p>
-                      <a:r>
-                        <a:rPr lang="de-CH"/>
-                        <a:t>return the motor state (e.g open / close)</a:t>
-                      </a:r>
-                      <a:endParaRPr lang="en-GB"/>
-                    </a:p>
-                  </a:txBody>
-                  <a:tcPr/>
-                </a:tc>
-                <a:extLst>
-                  <a:ext uri="{0D108BD9-81ED-4DB2-BD59-A6C34878D82A}">
-                    <a16:rowId xmlns:a16="http://schemas.microsoft.com/office/drawing/2014/main" val="3871996403"/>
-                  </a:ext>
-                </a:extLst>
-              </a:tr>
-              <a:tr h="370840">
-                <a:tc>
-                  <a:txBody>
-                    <a:bodyPr/>
-                    <a:lstStyle/>
-                    <a:p>
-                      <a:endParaRPr lang="en-GB"/>
-                    </a:p>
-                  </a:txBody>
-                  <a:tcPr/>
-                </a:tc>
-                <a:tc>
-                  <a:txBody>
-                    <a:bodyPr/>
-                    <a:lstStyle/>
-                    <a:p>
-                      <a:r>
-                        <a:rPr lang="de-CH"/>
-                        <a:t>GET</a:t>
-                      </a:r>
-                      <a:endParaRPr lang="en-GB"/>
-                    </a:p>
-                  </a:txBody>
-                  <a:tcPr/>
-                </a:tc>
-                <a:tc>
-                  <a:txBody>
-                    <a:bodyPr/>
-                    <a:lstStyle/>
-                    <a:p>
-                      <a:pPr marL="0" marR="0" lvl="0" indent="0" algn="l" defTabSz="914400" rtl="0" eaLnBrk="1" fontAlgn="auto" latinLnBrk="0" hangingPunct="1">
-                        <a:lnSpc>
-                          <a:spcPct val="100000"/>
-                        </a:lnSpc>
-                        <a:spcBef>
-                          <a:spcPts val="0"/>
-                        </a:spcBef>
-                        <a:spcAft>
-                          <a:spcPts val="0"/>
-                        </a:spcAft>
-                        <a:buClrTx/>
-                        <a:buSzTx/>
-                        <a:buFontTx/>
-                        <a:buNone/>
-                        <a:tabLst/>
-                        <a:defRPr/>
-                      </a:pPr>
-                      <a:r>
-                        <a:rPr lang="en-GB" sz="1800" b="0" kern="1200">
-                          <a:solidFill>
-                            <a:schemeClr val="dk1"/>
-                          </a:solidFill>
-                          <a:effectLst/>
-                          <a:latin typeface="+mn-lt"/>
-                          <a:ea typeface="+mn-ea"/>
-                          <a:cs typeface="+mn-cs"/>
-                        </a:rPr>
-                        <a:t>/api/total_operations</a:t>
-                      </a:r>
-                    </a:p>
-                  </a:txBody>
-                  <a:tcPr/>
-                </a:tc>
-                <a:tc>
-                  <a:txBody>
-                    <a:bodyPr/>
-                    <a:lstStyle/>
-                    <a:p>
-                      <a:r>
-                        <a:rPr lang="de-CH"/>
-                        <a:t>Return the </a:t>
-                      </a:r>
-                      <a:endParaRPr lang="en-GB"/>
-                    </a:p>
-                  </a:txBody>
-                  <a:tcPr/>
-                </a:tc>
-                <a:extLst>
-                  <a:ext uri="{0D108BD9-81ED-4DB2-BD59-A6C34878D82A}">
-                    <a16:rowId xmlns:a16="http://schemas.microsoft.com/office/drawing/2014/main" val="1235831096"/>
-                  </a:ext>
-                </a:extLst>
-              </a:tr>
-              <a:tr h="370840">
-                <a:tc>
-                  <a:txBody>
-                    <a:bodyPr/>
-                    <a:lstStyle/>
-                    <a:p>
-                      <a:endParaRPr lang="en-GB"/>
-                    </a:p>
-                  </a:txBody>
-                  <a:tcPr/>
-                </a:tc>
-                <a:tc>
-                  <a:txBody>
-                    <a:bodyPr/>
-                    <a:lstStyle/>
-                    <a:p>
-                      <a:r>
-                        <a:rPr lang="de-CH"/>
-                        <a:t>GET</a:t>
-                      </a:r>
-                      <a:endParaRPr lang="en-GB"/>
-                    </a:p>
-                  </a:txBody>
-                  <a:tcPr/>
-                </a:tc>
-                <a:tc>
-                  <a:txBody>
-                    <a:bodyPr/>
-                    <a:lstStyle/>
-                    <a:p>
-                      <a:pPr marL="0" marR="0" lvl="0" indent="0" algn="l" defTabSz="914400" rtl="0" eaLnBrk="1" fontAlgn="auto" latinLnBrk="0" hangingPunct="1">
-                        <a:lnSpc>
-                          <a:spcPct val="100000"/>
-                        </a:lnSpc>
-                        <a:spcBef>
-                          <a:spcPts val="0"/>
-                        </a:spcBef>
-                        <a:spcAft>
-                          <a:spcPts val="0"/>
-                        </a:spcAft>
-                        <a:buClrTx/>
-                        <a:buSzTx/>
-                        <a:buFontTx/>
-                        <a:buNone/>
-                        <a:tabLst/>
-                        <a:defRPr/>
-                      </a:pPr>
-                      <a:r>
-                        <a:rPr lang="de-CH" sz="1800" b="0" kern="1200">
-                          <a:solidFill>
-                            <a:schemeClr val="dk1"/>
-                          </a:solidFill>
-                          <a:effectLst/>
-                          <a:latin typeface="+mn-lt"/>
-                          <a:ea typeface="+mn-ea"/>
-                          <a:cs typeface="+mn-cs"/>
-                        </a:rPr>
-                        <a:t>/api/</a:t>
-                      </a:r>
-                      <a:r>
-                        <a:rPr lang="en-GB" sz="1800" b="0" kern="1200">
-                          <a:solidFill>
-                            <a:schemeClr val="dk1"/>
-                          </a:solidFill>
-                          <a:effectLst/>
-                          <a:latin typeface="+mn-lt"/>
-                          <a:ea typeface="+mn-ea"/>
-                          <a:cs typeface="+mn-cs"/>
-                        </a:rPr>
-                        <a:t>total_access</a:t>
-                      </a:r>
-                    </a:p>
-                  </a:txBody>
-                  <a:tcPr/>
-                </a:tc>
-                <a:tc>
-                  <a:txBody>
-                    <a:bodyPr/>
-                    <a:lstStyle/>
-                    <a:p>
-                      <a:r>
-                        <a:rPr lang="de-CH"/>
-                        <a:t>Returns the amount of door open / closed</a:t>
-                      </a:r>
-                    </a:p>
-                  </a:txBody>
-                  <a:tcPr/>
-                </a:tc>
-                <a:extLst>
-                  <a:ext uri="{0D108BD9-81ED-4DB2-BD59-A6C34878D82A}">
-                    <a16:rowId xmlns:a16="http://schemas.microsoft.com/office/drawing/2014/main" val="4117028430"/>
-                  </a:ext>
-                </a:extLst>
-              </a:tr>
-              <a:tr h="370840">
-                <a:tc>
-                  <a:txBody>
-                    <a:bodyPr/>
-                    <a:lstStyle/>
-                    <a:p>
-                      <a:endParaRPr lang="en-GB"/>
-                    </a:p>
-                  </a:txBody>
-                  <a:tcPr/>
-                </a:tc>
-                <a:tc>
-                  <a:txBody>
-                    <a:bodyPr/>
-                    <a:lstStyle/>
-                    <a:p>
-                      <a:r>
-                        <a:rPr lang="de-CH"/>
-                        <a:t>GET</a:t>
-                      </a:r>
-                      <a:endParaRPr lang="en-GB"/>
-                    </a:p>
-                  </a:txBody>
-                  <a:tcPr/>
-                </a:tc>
-                <a:tc>
-                  <a:txBody>
-                    <a:bodyPr/>
-                    <a:lstStyle/>
-                    <a:p>
-                      <a:pPr marL="0" marR="0" lvl="0" indent="0" algn="l" defTabSz="914400" rtl="0" eaLnBrk="1" fontAlgn="auto" latinLnBrk="0" hangingPunct="1">
-                        <a:lnSpc>
-                          <a:spcPct val="100000"/>
-                        </a:lnSpc>
-                        <a:spcBef>
-                          <a:spcPts val="0"/>
-                        </a:spcBef>
-                        <a:spcAft>
-                          <a:spcPts val="0"/>
-                        </a:spcAft>
-                        <a:buClrTx/>
-                        <a:buSzTx/>
-                        <a:buFontTx/>
-                        <a:buNone/>
-                        <a:tabLst/>
-                        <a:defRPr/>
-                      </a:pPr>
-                      <a:r>
-                        <a:rPr lang="de-CH" sz="1800" b="0" kern="1200">
-                          <a:solidFill>
-                            <a:schemeClr val="dk1"/>
-                          </a:solidFill>
-                          <a:effectLst/>
-                          <a:latin typeface="+mn-lt"/>
-                          <a:ea typeface="+mn-ea"/>
-                          <a:cs typeface="+mn-cs"/>
-                        </a:rPr>
-                        <a:t>/api/</a:t>
-                      </a:r>
-                      <a:r>
-                        <a:rPr lang="en-GB" sz="1800" b="0" kern="1200">
-                          <a:solidFill>
-                            <a:schemeClr val="dk1"/>
-                          </a:solidFill>
-                          <a:effectLst/>
-                          <a:latin typeface="+mn-lt"/>
-                          <a:ea typeface="+mn-ea"/>
-                          <a:cs typeface="+mn-cs"/>
-                        </a:rPr>
-                        <a:t>total_locations</a:t>
-                      </a:r>
-                    </a:p>
-                  </a:txBody>
-                  <a:tcPr/>
-                </a:tc>
-                <a:tc>
-                  <a:txBody>
-                    <a:bodyPr/>
-                    <a:lstStyle/>
-                    <a:p>
-                      <a:r>
-                        <a:rPr lang="de-CH"/>
-                        <a:t>Return a list of accessed locations (Fingerprint &amp; Browser)</a:t>
-                      </a:r>
-                      <a:endParaRPr lang="en-GB"/>
-                    </a:p>
-                  </a:txBody>
-                  <a:tcPr/>
-                </a:tc>
-                <a:extLst>
-                  <a:ext uri="{0D108BD9-81ED-4DB2-BD59-A6C34878D82A}">
-                    <a16:rowId xmlns:a16="http://schemas.microsoft.com/office/drawing/2014/main" val="462791865"/>
-                  </a:ext>
-                </a:extLst>
-              </a:tr>
-              <a:tr h="370840">
-                <a:tc>
-                  <a:txBody>
-                    <a:bodyPr/>
-                    <a:lstStyle/>
-                    <a:p>
-                      <a:endParaRPr lang="en-GB"/>
-                    </a:p>
-                  </a:txBody>
-                  <a:tcPr/>
-                </a:tc>
-                <a:tc>
-                  <a:txBody>
-                    <a:bodyPr/>
-                    <a:lstStyle/>
-                    <a:p>
-                      <a:r>
-                        <a:rPr lang="de-CH"/>
-                        <a:t>POST</a:t>
-                      </a:r>
-                      <a:endParaRPr lang="en-GB"/>
-                    </a:p>
-                  </a:txBody>
-                  <a:tcPr/>
-                </a:tc>
-                <a:tc>
-                  <a:txBody>
-                    <a:bodyPr/>
-                    <a:lstStyle/>
-                    <a:p>
-                      <a:pPr marL="0" marR="0" lvl="0" indent="0" algn="l" defTabSz="914400" rtl="0" eaLnBrk="1" fontAlgn="auto" latinLnBrk="0" hangingPunct="1">
-                        <a:lnSpc>
-                          <a:spcPct val="100000"/>
-                        </a:lnSpc>
-                        <a:spcBef>
-                          <a:spcPts val="0"/>
-                        </a:spcBef>
-                        <a:spcAft>
-                          <a:spcPts val="0"/>
-                        </a:spcAft>
-                        <a:buClrTx/>
-                        <a:buSzTx/>
-                        <a:buFontTx/>
-                        <a:buNone/>
-                        <a:tabLst/>
-                        <a:defRPr/>
-                      </a:pPr>
-                      <a:r>
-                        <a:rPr lang="de-CH" sz="1800" b="0" kern="1200">
-                          <a:solidFill>
-                            <a:schemeClr val="dk1"/>
-                          </a:solidFill>
-                          <a:effectLst/>
-                          <a:latin typeface="+mn-lt"/>
-                          <a:ea typeface="+mn-ea"/>
-                          <a:cs typeface="+mn-cs"/>
-                        </a:rPr>
-                        <a:t>/api/</a:t>
-                      </a:r>
-                      <a:r>
-                        <a:rPr lang="en-GB" sz="1800" b="0" kern="1200">
-                          <a:solidFill>
-                            <a:schemeClr val="dk1"/>
-                          </a:solidFill>
-                          <a:effectLst/>
-                          <a:latin typeface="+mn-lt"/>
-                          <a:ea typeface="+mn-ea"/>
-                          <a:cs typeface="+mn-cs"/>
-                        </a:rPr>
-                        <a:t>location</a:t>
-                      </a:r>
-                    </a:p>
-                  </a:txBody>
-                  <a:tcPr/>
-                </a:tc>
-                <a:tc>
-                  <a:txBody>
-                    <a:bodyPr/>
-                    <a:lstStyle/>
-                    <a:p>
-                      <a:r>
-                        <a:rPr lang="de-CH" err="1"/>
-                        <a:t>Adds</a:t>
-                      </a:r>
-                      <a:r>
-                        <a:rPr lang="de-CH"/>
-                        <a:t> </a:t>
-                      </a:r>
-                      <a:r>
-                        <a:rPr lang="de-CH" err="1"/>
-                        <a:t>access</a:t>
-                      </a:r>
-                      <a:r>
-                        <a:rPr lang="de-CH"/>
-                        <a:t> </a:t>
-                      </a:r>
-                      <a:r>
-                        <a:rPr lang="de-CH" err="1"/>
-                        <a:t>location</a:t>
-                      </a:r>
-                      <a:r>
-                        <a:rPr lang="de-CH"/>
-                        <a:t> </a:t>
-                      </a:r>
-                      <a:r>
-                        <a:rPr lang="de-CH" err="1"/>
-                        <a:t>to</a:t>
-                      </a:r>
-                      <a:r>
-                        <a:rPr lang="de-CH"/>
-                        <a:t> DB</a:t>
-                      </a:r>
-                      <a:endParaRPr lang="en-GB"/>
-                    </a:p>
-                  </a:txBody>
-                  <a:tcPr/>
-                </a:tc>
-                <a:extLst>
-                  <a:ext uri="{0D108BD9-81ED-4DB2-BD59-A6C34878D82A}">
-                    <a16:rowId xmlns:a16="http://schemas.microsoft.com/office/drawing/2014/main" val="3446092431"/>
-                  </a:ext>
-                </a:extLst>
-              </a:tr>
-            </a:tbl>
-          </a:graphicData>
-        </a:graphic>
-      </p:graphicFrame>
-    </p:spTree>
-    <p:extLst>
-      <p:ext uri="{BB962C8B-B14F-4D97-AF65-F5344CB8AC3E}">
-        <p14:creationId xmlns:p14="http://schemas.microsoft.com/office/powerpoint/2010/main" val="2764945644"/>
-      </p:ext>
-    </p:extLst>
-  </p:cSld>
-  <p:clrMapOvr>
-    <a:masterClrMapping/>
-  </p:clrMapOvr>
-</p:sld>
-</file>
-
-<file path=ppt/slides/slide7.xml><?xml version="1.0" encoding="utf-8"?>
-<p:sld xmlns:a="http://schemas.openxmlformats.org/drawingml/2006/main" xmlns:r="http://schemas.openxmlformats.org/officeDocument/2006/relationships" xmlns:p="http://schemas.openxmlformats.org/presentationml/2006/main">
-  <p:cSld>
-    <p:bg>
-      <p:bgPr>
-        <a:solidFill>
-          <a:schemeClr val="bg1"/>
-        </a:solidFill>
-        <a:effectLst/>
-      </p:bgPr>
-    </p:bg>
-    <p:spTree>
-      <p:nvGrpSpPr>
-        <p:cNvPr id="1" name=""/>
-        <p:cNvGrpSpPr/>
-        <p:nvPr/>
-      </p:nvGrpSpPr>
-      <p:grpSpPr>
-        <a:xfrm>
-          <a:off x="0" y="0"/>
-          <a:ext cx="0" cy="0"/>
-          <a:chOff x="0" y="0"/>
-          <a:chExt cx="0" cy="0"/>
-        </a:xfrm>
-      </p:grpSpPr>
-      <p:sp useBgFill="1">
-        <p:nvSpPr>
-          <p:cNvPr id="8" name="Rectangle 7">
-            <a:extLst>
-              <a:ext uri="{FF2B5EF4-FFF2-40B4-BE49-F238E27FC236}">
-                <a16:creationId xmlns:a16="http://schemas.microsoft.com/office/drawing/2014/main" id="{1B15ED52-F352-441B-82BF-E0EA34836D08}"/>
-              </a:ext>
-              <a:ext uri="{C183D7F6-B498-43B3-948B-1728B52AA6E4}">
-                <adec:decorative xmlns:adec="http://schemas.microsoft.com/office/drawing/2017/decorative" val="1"/>
-              </a:ext>
-            </a:extLst>
-          </p:cNvPr>
-          <p:cNvSpPr>
-            <a:spLocks noGrp="1" noRot="1" noChangeAspect="1" noMove="1" noResize="1" noEditPoints="1" noAdjustHandles="1" noChangeArrowheads="1" noChangeShapeType="1" noTextEdit="1"/>
-          </p:cNvSpPr>
-          <p:nvPr>
-            <p:extLst>
-              <p:ext uri="{386F3935-93C4-4BCD-93E2-E3B085C9AB24}">
-                <p16:designElem xmlns:p16="http://schemas.microsoft.com/office/powerpoint/2015/main" val="1"/>
-              </p:ext>
-            </p:extLst>
-          </p:nvPr>
-        </p:nvSpPr>
+        </p:nvPicPr>
+        <p:blipFill>
+          <a:blip r:embed="rId2">
+            <a:extLst>
+              <a:ext uri="{28A0092B-C50C-407E-A947-70E740481C1C}">
+                <a14:useLocalDpi xmlns:a14="http://schemas.microsoft.com/office/drawing/2010/main" val="0"/>
+              </a:ext>
+            </a:extLst>
+          </a:blip>
+          <a:stretch>
+            <a:fillRect/>
+          </a:stretch>
+        </p:blipFill>
         <p:spPr>
           <a:xfrm>
-            <a:off x="0" y="0"/>
-            <a:ext cx="12192000" cy="6858000"/>
+            <a:off x="-7" y="1572601"/>
+            <a:ext cx="5285399" cy="5285399"/>
+          </a:xfrm>
+        </p:spPr>
+      </p:pic>
+      <p:sp>
+        <p:nvSpPr>
+          <p:cNvPr id="13" name="Textfeld 12">
+            <a:extLst>
+              <a:ext uri="{FF2B5EF4-FFF2-40B4-BE49-F238E27FC236}">
+                <a16:creationId xmlns:a16="http://schemas.microsoft.com/office/drawing/2014/main" id="{3B3AEBB1-E958-4E26-A562-2638EFD01244}"/>
+              </a:ext>
+            </a:extLst>
+          </p:cNvPr>
+          <p:cNvSpPr txBox="1"/>
+          <p:nvPr/>
+        </p:nvSpPr>
+        <p:spPr>
+          <a:xfrm>
+            <a:off x="5690694" y="2200980"/>
+            <a:ext cx="6096000" cy="369332"/>
           </a:xfrm>
           <a:prstGeom prst="rect">
             <a:avLst/>
           </a:prstGeom>
-          <a:ln w="12700" cap="flat" cmpd="sng" algn="ctr">
-            <a:noFill/>
-            <a:prstDash val="solid"/>
-            <a:miter lim="800000"/>
-          </a:ln>
-          <a:effectLst/>
-          <a:extLst>
-            <a:ext uri="{91240B29-F687-4F45-9708-019B960494DF}">
-              <a14:hiddenLine xmlns:a14="http://schemas.microsoft.com/office/drawing/2010/main" w="12700" cap="flat" cmpd="sng" algn="ctr">
-                <a:solidFill>
-                  <a:schemeClr val="accent1">
-                    <a:shade val="50000"/>
-                  </a:schemeClr>
-                </a:solidFill>
-                <a:prstDash val="solid"/>
-                <a:miter lim="800000"/>
-              </a14:hiddenLine>
-            </a:ext>
-          </a:extLst>
+          <a:noFill/>
         </p:spPr>
-        <p:style>
-          <a:lnRef idx="2">
-            <a:schemeClr val="accent1">
-              <a:shade val="50000"/>
-            </a:schemeClr>
-          </a:lnRef>
-          <a:fillRef idx="1">
-            <a:schemeClr val="accent1"/>
-          </a:fillRef>
-          <a:effectRef idx="0">
-            <a:schemeClr val="accent1"/>
-          </a:effectRef>
-          <a:fontRef idx="minor">
-            <a:schemeClr val="lt1"/>
-          </a:fontRef>
-        </p:style>
-        <p:txBody>
-          <a:bodyPr rtlCol="0" anchor="ctr"/>
-          <a:lstStyle/>
-          <a:p>
-            <a:pPr algn="ctr"/>
-            <a:endParaRPr lang="en-US"/>
-          </a:p>
-        </p:txBody>
-      </p:sp>
-      <p:sp>
-        <p:nvSpPr>
-          <p:cNvPr id="10" name="Rectangle 9">
-            <a:extLst>
-              <a:ext uri="{FF2B5EF4-FFF2-40B4-BE49-F238E27FC236}">
-                <a16:creationId xmlns:a16="http://schemas.microsoft.com/office/drawing/2014/main" id="{3B2E3793-BFE6-45A2-9B7B-E18844431C99}"/>
-              </a:ext>
-              <a:ext uri="{C183D7F6-B498-43B3-948B-1728B52AA6E4}">
-                <adec:decorative xmlns:adec="http://schemas.microsoft.com/office/drawing/2017/decorative" val="1"/>
-              </a:ext>
-            </a:extLst>
-          </p:cNvPr>
-          <p:cNvSpPr>
-            <a:spLocks noGrp="1" noRot="1" noChangeAspect="1" noMove="1" noResize="1" noEditPoints="1" noAdjustHandles="1" noChangeArrowheads="1" noChangeShapeType="1" noTextEdit="1"/>
-          </p:cNvSpPr>
-          <p:nvPr>
-            <p:extLst>
-              <p:ext uri="{386F3935-93C4-4BCD-93E2-E3B085C9AB24}">
-                <p16:designElem xmlns:p16="http://schemas.microsoft.com/office/powerpoint/2015/main" val="1"/>
-              </p:ext>
-            </p:extLst>
-          </p:nvPr>
+        <p:txBody>
+          <a:bodyPr wrap="square">
+            <a:spAutoFit/>
+          </a:bodyPr>
+          <a:lstStyle/>
+          <a:p>
+            <a:r>
+              <a:rPr lang="en-GB" dirty="0">
+                <a:hlinkClick r:id="rId3"/>
+              </a:rPr>
+              <a:t>https://www.youtube.com/watch?v=CA1w-btZJAM</a:t>
+            </a:r>
+            <a:r>
+              <a:rPr lang="en-GB" dirty="0"/>
+              <a:t> </a:t>
+            </a:r>
+          </a:p>
+        </p:txBody>
+      </p:sp>
+      <p:sp>
+        <p:nvSpPr>
+          <p:cNvPr id="11" name="Textfeld 10">
+            <a:extLst>
+              <a:ext uri="{FF2B5EF4-FFF2-40B4-BE49-F238E27FC236}">
+                <a16:creationId xmlns:a16="http://schemas.microsoft.com/office/drawing/2014/main" id="{9AC3B11C-0AE3-4A59-8003-382F1A60EAAB}"/>
+              </a:ext>
+            </a:extLst>
+          </p:cNvPr>
+          <p:cNvSpPr txBox="1"/>
+          <p:nvPr/>
         </p:nvSpPr>
         <p:spPr>
-          <a:xfrm flipH="1">
-            <a:off x="-1" y="-1"/>
-            <a:ext cx="12191998" cy="1590742"/>
+          <a:xfrm>
+            <a:off x="5691460" y="3778499"/>
+            <a:ext cx="6095234" cy="369332"/>
           </a:xfrm>
           <a:prstGeom prst="rect">
             <a:avLst/>
           </a:prstGeom>
-          <a:gradFill>
-            <a:gsLst>
-              <a:gs pos="0">
-                <a:srgbClr val="000000"/>
-              </a:gs>
-              <a:gs pos="100000">
-                <a:schemeClr val="accent1">
-                  <a:lumMod val="75000"/>
-                </a:schemeClr>
-              </a:gs>
-            </a:gsLst>
-            <a:lin ang="8400000" scaled="0"/>
-          </a:gradFill>
-          <a:ln>
-            <a:noFill/>
-          </a:ln>
+          <a:noFill/>
         </p:spPr>
-        <p:style>
-          <a:lnRef idx="2">
-            <a:schemeClr val="accent1">
-              <a:shade val="50000"/>
-            </a:schemeClr>
-          </a:lnRef>
-          <a:fillRef idx="1">
-            <a:schemeClr val="accent1"/>
-          </a:fillRef>
-          <a:effectRef idx="0">
-            <a:schemeClr val="accent1"/>
-          </a:effectRef>
-          <a:fontRef idx="minor">
-            <a:schemeClr val="lt1"/>
-          </a:fontRef>
-        </p:style>
-        <p:txBody>
-          <a:bodyPr rtlCol="0" anchor="ctr"/>
-          <a:lstStyle/>
-          <a:p>
-            <a:pPr algn="ctr"/>
-            <a:endParaRPr lang="en-US"/>
-          </a:p>
-        </p:txBody>
-      </p:sp>
-      <p:sp>
-        <p:nvSpPr>
-          <p:cNvPr id="12" name="Rectangle 11">
-            <a:extLst>
-              <a:ext uri="{FF2B5EF4-FFF2-40B4-BE49-F238E27FC236}">
-                <a16:creationId xmlns:a16="http://schemas.microsoft.com/office/drawing/2014/main" id="{BC4C4868-CB8F-4AF9-9CDB-8108F2C19B67}"/>
-              </a:ext>
-              <a:ext uri="{C183D7F6-B498-43B3-948B-1728B52AA6E4}">
-                <adec:decorative xmlns:adec="http://schemas.microsoft.com/office/drawing/2017/decorative" val="1"/>
-              </a:ext>
-            </a:extLst>
-          </p:cNvPr>
-          <p:cNvSpPr>
-            <a:spLocks noGrp="1" noRot="1" noChangeAspect="1" noMove="1" noResize="1" noEditPoints="1" noAdjustHandles="1" noChangeArrowheads="1" noChangeShapeType="1" noTextEdit="1"/>
-          </p:cNvSpPr>
-          <p:nvPr>
-            <p:extLst>
-              <p:ext uri="{386F3935-93C4-4BCD-93E2-E3B085C9AB24}">
-                <p16:designElem xmlns:p16="http://schemas.microsoft.com/office/powerpoint/2015/main" val="1"/>
-              </p:ext>
-            </p:extLst>
-          </p:nvPr>
-        </p:nvSpPr>
-        <p:spPr>
-          <a:xfrm rot="10800000" flipH="1">
-            <a:off x="-3" y="0"/>
-            <a:ext cx="8115306" cy="1590742"/>
-          </a:xfrm>
-          <a:prstGeom prst="rect">
-            <a:avLst/>
-          </a:prstGeom>
-          <a:gradFill>
-            <a:gsLst>
-              <a:gs pos="20000">
-                <a:schemeClr val="accent1">
-                  <a:alpha val="0"/>
-                </a:schemeClr>
-              </a:gs>
-              <a:gs pos="100000">
-                <a:schemeClr val="accent1">
-                  <a:lumMod val="50000"/>
-                  <a:alpha val="55000"/>
-                </a:schemeClr>
-              </a:gs>
-            </a:gsLst>
-            <a:lin ang="13800000" scaled="0"/>
-          </a:gradFill>
-          <a:ln>
-            <a:noFill/>
-          </a:ln>
-        </p:spPr>
-        <p:style>
-          <a:lnRef idx="2">
-            <a:schemeClr val="accent1">
-              <a:shade val="50000"/>
-            </a:schemeClr>
-          </a:lnRef>
-          <a:fillRef idx="1">
-            <a:schemeClr val="accent1"/>
-          </a:fillRef>
-          <a:effectRef idx="0">
-            <a:schemeClr val="accent1"/>
-          </a:effectRef>
-          <a:fontRef idx="minor">
-            <a:schemeClr val="lt1"/>
-          </a:fontRef>
-        </p:style>
-        <p:txBody>
-          <a:bodyPr rtlCol="0" anchor="ctr"/>
-          <a:lstStyle/>
-          <a:p>
-            <a:pPr algn="ctr"/>
-            <a:endParaRPr lang="en-US"/>
-          </a:p>
-        </p:txBody>
-      </p:sp>
-      <p:sp>
-        <p:nvSpPr>
-          <p:cNvPr id="14" name="Rectangle 13">
-            <a:extLst>
-              <a:ext uri="{FF2B5EF4-FFF2-40B4-BE49-F238E27FC236}">
-                <a16:creationId xmlns:a16="http://schemas.microsoft.com/office/drawing/2014/main" id="{375E0459-6403-40CD-989D-56A4407CA12E}"/>
-              </a:ext>
-              <a:ext uri="{C183D7F6-B498-43B3-948B-1728B52AA6E4}">
-                <adec:decorative xmlns:adec="http://schemas.microsoft.com/office/drawing/2017/decorative" val="1"/>
-              </a:ext>
-            </a:extLst>
-          </p:cNvPr>
-          <p:cNvSpPr>
-            <a:spLocks noGrp="1" noRot="1" noChangeAspect="1" noMove="1" noResize="1" noEditPoints="1" noAdjustHandles="1" noChangeArrowheads="1" noChangeShapeType="1" noTextEdit="1"/>
-          </p:cNvSpPr>
-          <p:nvPr>
-            <p:extLst>
-              <p:ext uri="{386F3935-93C4-4BCD-93E2-E3B085C9AB24}">
-                <p16:designElem xmlns:p16="http://schemas.microsoft.com/office/powerpoint/2015/main" val="1"/>
-              </p:ext>
-            </p:extLst>
-          </p:nvPr>
-        </p:nvSpPr>
-        <p:spPr>
-          <a:xfrm flipH="1">
-            <a:off x="8115299" y="-1"/>
-            <a:ext cx="4076698" cy="1590742"/>
-          </a:xfrm>
-          <a:prstGeom prst="rect">
-            <a:avLst/>
-          </a:prstGeom>
-          <a:gradFill>
-            <a:gsLst>
-              <a:gs pos="0">
-                <a:schemeClr val="accent1">
-                  <a:alpha val="66000"/>
-                </a:schemeClr>
-              </a:gs>
-              <a:gs pos="100000">
-                <a:srgbClr val="000000">
-                  <a:alpha val="30000"/>
-                </a:srgbClr>
-              </a:gs>
-            </a:gsLst>
-            <a:lin ang="13200000" scaled="0"/>
-          </a:gradFill>
-          <a:ln>
-            <a:noFill/>
-          </a:ln>
-        </p:spPr>
-        <p:style>
-          <a:lnRef idx="2">
-            <a:schemeClr val="accent1">
-              <a:shade val="50000"/>
-            </a:schemeClr>
-          </a:lnRef>
-          <a:fillRef idx="1">
-            <a:schemeClr val="accent1"/>
-          </a:fillRef>
-          <a:effectRef idx="0">
-            <a:schemeClr val="accent1"/>
-          </a:effectRef>
-          <a:fontRef idx="minor">
-            <a:schemeClr val="lt1"/>
-          </a:fontRef>
-        </p:style>
-        <p:txBody>
-          <a:bodyPr rtlCol="0" anchor="ctr"/>
-          <a:lstStyle/>
-          <a:p>
-            <a:pPr algn="ctr"/>
-            <a:endParaRPr lang="en-US"/>
-          </a:p>
-        </p:txBody>
-      </p:sp>
-      <p:sp>
-        <p:nvSpPr>
-          <p:cNvPr id="16" name="Rectangle 15">
-            <a:extLst>
-              <a:ext uri="{FF2B5EF4-FFF2-40B4-BE49-F238E27FC236}">
-                <a16:creationId xmlns:a16="http://schemas.microsoft.com/office/drawing/2014/main" id="{53E5B1A8-3AC9-4BD1-9BBC-78CA94F2D1BA}"/>
-              </a:ext>
-              <a:ext uri="{C183D7F6-B498-43B3-948B-1728B52AA6E4}">
-                <adec:decorative xmlns:adec="http://schemas.microsoft.com/office/drawing/2017/decorative" val="1"/>
-              </a:ext>
-            </a:extLst>
-          </p:cNvPr>
-          <p:cNvSpPr>
-            <a:spLocks noGrp="1" noRot="1" noChangeAspect="1" noMove="1" noResize="1" noEditPoints="1" noAdjustHandles="1" noChangeArrowheads="1" noChangeShapeType="1" noTextEdit="1"/>
-          </p:cNvSpPr>
-          <p:nvPr>
-            <p:extLst>
-              <p:ext uri="{386F3935-93C4-4BCD-93E2-E3B085C9AB24}">
-                <p16:designElem xmlns:p16="http://schemas.microsoft.com/office/powerpoint/2015/main" val="1"/>
-              </p:ext>
-            </p:extLst>
-          </p:nvPr>
-        </p:nvSpPr>
-        <p:spPr>
-          <a:xfrm>
-            <a:off x="459350" y="-1"/>
-            <a:ext cx="11732646" cy="1597433"/>
-          </a:xfrm>
-          <a:prstGeom prst="rect">
-            <a:avLst/>
-          </a:prstGeom>
-          <a:gradFill>
-            <a:gsLst>
-              <a:gs pos="50000">
-                <a:srgbClr val="000000">
-                  <a:alpha val="0"/>
-                </a:srgbClr>
-              </a:gs>
-              <a:gs pos="99000">
-                <a:schemeClr val="accent1">
-                  <a:lumMod val="50000"/>
-                  <a:alpha val="52000"/>
-                </a:schemeClr>
-              </a:gs>
-            </a:gsLst>
-            <a:lin ang="16800000" scaled="0"/>
-          </a:gradFill>
-          <a:ln>
-            <a:noFill/>
-          </a:ln>
-        </p:spPr>
-        <p:style>
-          <a:lnRef idx="2">
-            <a:schemeClr val="accent1">
-              <a:shade val="50000"/>
-            </a:schemeClr>
-          </a:lnRef>
-          <a:fillRef idx="1">
-            <a:schemeClr val="accent1"/>
-          </a:fillRef>
-          <a:effectRef idx="0">
-            <a:schemeClr val="accent1"/>
-          </a:effectRef>
-          <a:fontRef idx="minor">
-            <a:schemeClr val="lt1"/>
-          </a:fontRef>
-        </p:style>
-        <p:txBody>
-          <a:bodyPr rtlCol="0" anchor="ctr"/>
-          <a:lstStyle/>
-          <a:p>
-            <a:pPr algn="ctr"/>
-            <a:endParaRPr lang="en-US"/>
-          </a:p>
-        </p:txBody>
-      </p:sp>
-      <p:sp>
-        <p:nvSpPr>
-          <p:cNvPr id="2" name="Titel 1">
-            <a:extLst>
-              <a:ext uri="{FF2B5EF4-FFF2-40B4-BE49-F238E27FC236}">
-                <a16:creationId xmlns:a16="http://schemas.microsoft.com/office/drawing/2014/main" id="{D7415D3F-1E15-4E59-BF76-33DA9EEB2E54}"/>
-              </a:ext>
-            </a:extLst>
-          </p:cNvPr>
-          <p:cNvSpPr>
-            <a:spLocks noGrp="1"/>
-          </p:cNvSpPr>
-          <p:nvPr>
-            <p:ph type="title"/>
-          </p:nvPr>
-        </p:nvSpPr>
-        <p:spPr>
-          <a:xfrm>
-            <a:off x="1371599" y="294538"/>
-            <a:ext cx="9895951" cy="1033669"/>
-          </a:xfrm>
-        </p:spPr>
-        <p:txBody>
-          <a:bodyPr>
-            <a:normAutofit/>
+        <p:txBody>
+          <a:bodyPr wrap="square">
+            <a:spAutoFit/>
           </a:bodyPr>
           <a:lstStyle/>
           <a:p>
             <a:r>
-              <a:rPr lang="de-DE" sz="4000">
-                <a:solidFill>
-                  <a:srgbClr val="FFFFFF"/>
-                </a:solidFill>
+              <a:rPr lang="en-GB" dirty="0">
+                <a:hlinkClick r:id="rId4"/>
               </a:rPr>
-              <a:t>Issues und Herausforderungen</a:t>
-            </a:r>
-            <a:endParaRPr lang="de-CH" sz="4000">
-              <a:solidFill>
-                <a:srgbClr val="FFFFFF"/>
-              </a:solidFill>
-            </a:endParaRPr>
-          </a:p>
-        </p:txBody>
-      </p:sp>
-      <p:sp>
-        <p:nvSpPr>
-          <p:cNvPr id="5" name="Inhaltsplatzhalter 4">
-            <a:extLst>
-              <a:ext uri="{FF2B5EF4-FFF2-40B4-BE49-F238E27FC236}">
-                <a16:creationId xmlns:a16="http://schemas.microsoft.com/office/drawing/2014/main" id="{4126DD72-7EE1-421E-9B86-F13E74DCB0A3}"/>
-              </a:ext>
-            </a:extLst>
-          </p:cNvPr>
-          <p:cNvSpPr>
-            <a:spLocks noGrp="1"/>
-          </p:cNvSpPr>
-          <p:nvPr>
-            <p:ph idx="1"/>
-          </p:nvPr>
-        </p:nvSpPr>
-        <p:spPr/>
-        <p:txBody>
-          <a:bodyPr>
-            <a:normAutofit/>
-          </a:bodyPr>
-          <a:lstStyle/>
-          <a:p>
-            <a:endParaRPr lang="de-CH" dirty="0"/>
-          </a:p>
-          <a:p>
-            <a:r>
-              <a:rPr lang="de-CH" sz="2000" dirty="0"/>
-              <a:t>Wie kann die Lösung abgesichert werden</a:t>
-            </a:r>
-          </a:p>
-          <a:p>
-            <a:pPr lvl="1"/>
-            <a:r>
-              <a:rPr lang="de-CH" sz="2000" dirty="0" err="1"/>
-              <a:t>ZerotrustVPN</a:t>
-            </a:r>
-            <a:r>
-              <a:rPr lang="de-CH" sz="2000" dirty="0"/>
-              <a:t>, </a:t>
-            </a:r>
-            <a:r>
-              <a:rPr lang="de-CH" sz="2000" dirty="0" err="1"/>
-              <a:t>DoorControl</a:t>
-            </a:r>
-            <a:r>
-              <a:rPr lang="de-CH" sz="2000" dirty="0"/>
-              <a:t> nur möglich wenn GPS aktiviert ist</a:t>
-            </a:r>
-          </a:p>
-          <a:p>
-            <a:pPr lvl="1"/>
-            <a:r>
-              <a:rPr lang="de-CH" sz="2000" dirty="0"/>
-              <a:t>GPS</a:t>
-            </a:r>
-          </a:p>
-          <a:p>
-            <a:pPr lvl="1"/>
-            <a:r>
-              <a:rPr lang="de-CH" sz="2000" dirty="0"/>
-              <a:t>SSL für alle Endpunkte</a:t>
-            </a:r>
-          </a:p>
-          <a:p>
-            <a:pPr lvl="1"/>
-            <a:endParaRPr lang="de-CH" sz="2000" dirty="0"/>
-          </a:p>
-          <a:p>
-            <a:r>
-              <a:rPr lang="de-CH" sz="2000" dirty="0"/>
-              <a:t>Türstatus (Bolzenstatus) </a:t>
-            </a:r>
-            <a:r>
-              <a:rPr lang="de-CH" sz="2000" dirty="0" err="1"/>
-              <a:t>sync</a:t>
-            </a:r>
-            <a:r>
-              <a:rPr lang="de-CH" sz="2000" dirty="0"/>
-              <a:t> via USB-Serial</a:t>
-            </a:r>
-          </a:p>
-          <a:p>
-            <a:pPr lvl="1"/>
-            <a:r>
-              <a:rPr lang="de-CH" sz="2000" dirty="0"/>
-              <a:t>Türstatus wird jede Sekunde auf dem USB-Port geloggt</a:t>
-            </a:r>
-          </a:p>
-          <a:p>
-            <a:pPr marL="457200" lvl="1" indent="0">
-              <a:buNone/>
-            </a:pPr>
-            <a:endParaRPr lang="de-CH" sz="2000" dirty="0"/>
-          </a:p>
-          <a:p>
-            <a:r>
-              <a:rPr lang="de-CH" sz="2000" dirty="0" err="1"/>
-              <a:t>Let’s</a:t>
-            </a:r>
-            <a:r>
-              <a:rPr lang="de-CH" sz="2000" dirty="0"/>
+              <a:t>https://youtu.be/5wwKeLx9Ajc</a:t>
+            </a:r>
+            <a:r>
+              <a:rPr lang="en-GB" dirty="0"/>
               <a:t> </a:t>
             </a:r>
-            <a:r>
-              <a:rPr lang="de-CH" sz="2000" dirty="0" err="1"/>
-              <a:t>encrypt</a:t>
-            </a:r>
-            <a:r>
-              <a:rPr lang="de-CH" sz="2000" dirty="0"/>
-              <a:t> SSL-Zertifikate für privaten IP-range (e.g. Zerotrust VPN)</a:t>
-            </a:r>
-          </a:p>
-          <a:p>
-            <a:pPr lvl="1"/>
-            <a:endParaRPr lang="de-CH" sz="2000" dirty="0"/>
-          </a:p>
-          <a:p>
-            <a:pPr lvl="1"/>
-            <a:endParaRPr lang="de-CH" sz="2000" dirty="0"/>
-          </a:p>
-          <a:p>
-            <a:endParaRPr lang="de-CH" dirty="0"/>
-          </a:p>
-          <a:p>
-            <a:endParaRPr lang="en-GB" dirty="0"/>
-          </a:p>
-        </p:txBody>
-      </p:sp>
-    </p:spTree>
-    <p:extLst>
-      <p:ext uri="{BB962C8B-B14F-4D97-AF65-F5344CB8AC3E}">
-        <p14:creationId xmlns:p14="http://schemas.microsoft.com/office/powerpoint/2010/main" val="3463889109"/>
-      </p:ext>
-    </p:extLst>
-  </p:cSld>
-  <p:clrMapOvr>
-    <a:masterClrMapping/>
-  </p:clrMapOvr>
-</p:sld>
-</file>
-
-<file path=ppt/slides/slide8.xml><?xml version="1.0" encoding="utf-8"?>
-<p:sld xmlns:a="http://schemas.openxmlformats.org/drawingml/2006/main" xmlns:r="http://schemas.openxmlformats.org/officeDocument/2006/relationships" xmlns:p="http://schemas.openxmlformats.org/presentationml/2006/main">
-  <p:cSld>
-    <p:bg>
-      <p:bgPr>
-        <a:solidFill>
-          <a:schemeClr val="bg1"/>
-        </a:solidFill>
-        <a:effectLst/>
-      </p:bgPr>
-    </p:bg>
-    <p:spTree>
-      <p:nvGrpSpPr>
-        <p:cNvPr id="1" name=""/>
-        <p:cNvGrpSpPr/>
-        <p:nvPr/>
-      </p:nvGrpSpPr>
-      <p:grpSpPr>
-        <a:xfrm>
-          <a:off x="0" y="0"/>
-          <a:ext cx="0" cy="0"/>
-          <a:chOff x="0" y="0"/>
-          <a:chExt cx="0" cy="0"/>
-        </a:xfrm>
-      </p:grpSpPr>
-      <p:sp useBgFill="1">
-        <p:nvSpPr>
-          <p:cNvPr id="8" name="Rectangle 7">
-            <a:extLst>
-              <a:ext uri="{FF2B5EF4-FFF2-40B4-BE49-F238E27FC236}">
-                <a16:creationId xmlns:a16="http://schemas.microsoft.com/office/drawing/2014/main" id="{1B15ED52-F352-441B-82BF-E0EA34836D08}"/>
-              </a:ext>
-              <a:ext uri="{C183D7F6-B498-43B3-948B-1728B52AA6E4}">
-                <adec:decorative xmlns:adec="http://schemas.microsoft.com/office/drawing/2017/decorative" val="1"/>
-              </a:ext>
-            </a:extLst>
-          </p:cNvPr>
-          <p:cNvSpPr>
-            <a:spLocks noGrp="1" noRot="1" noChangeAspect="1" noMove="1" noResize="1" noEditPoints="1" noAdjustHandles="1" noChangeArrowheads="1" noChangeShapeType="1" noTextEdit="1"/>
-          </p:cNvSpPr>
-          <p:nvPr>
-            <p:extLst>
-              <p:ext uri="{386F3935-93C4-4BCD-93E2-E3B085C9AB24}">
-                <p16:designElem xmlns:p16="http://schemas.microsoft.com/office/powerpoint/2015/main" val="1"/>
-              </p:ext>
-            </p:extLst>
-          </p:nvPr>
-        </p:nvSpPr>
-        <p:spPr>
-          <a:xfrm>
-            <a:off x="0" y="0"/>
-            <a:ext cx="12192000" cy="6858000"/>
-          </a:xfrm>
-          <a:prstGeom prst="rect">
-            <a:avLst/>
-          </a:prstGeom>
-          <a:ln w="12700" cap="flat" cmpd="sng" algn="ctr">
-            <a:noFill/>
-            <a:prstDash val="solid"/>
-            <a:miter lim="800000"/>
-          </a:ln>
-          <a:effectLst/>
-          <a:extLst>
-            <a:ext uri="{91240B29-F687-4F45-9708-019B960494DF}">
-              <a14:hiddenLine xmlns:a14="http://schemas.microsoft.com/office/drawing/2010/main" w="12700" cap="flat" cmpd="sng" algn="ctr">
-                <a:solidFill>
-                  <a:schemeClr val="accent1">
-                    <a:shade val="50000"/>
-                  </a:schemeClr>
-                </a:solidFill>
-                <a:prstDash val="solid"/>
-                <a:miter lim="800000"/>
-              </a14:hiddenLine>
-            </a:ext>
-          </a:extLst>
-        </p:spPr>
-        <p:style>
-          <a:lnRef idx="2">
-            <a:schemeClr val="accent1">
-              <a:shade val="50000"/>
-            </a:schemeClr>
-          </a:lnRef>
-          <a:fillRef idx="1">
-            <a:schemeClr val="accent1"/>
-          </a:fillRef>
-          <a:effectRef idx="0">
-            <a:schemeClr val="accent1"/>
-          </a:effectRef>
-          <a:fontRef idx="minor">
-            <a:schemeClr val="lt1"/>
-          </a:fontRef>
-        </p:style>
-        <p:txBody>
-          <a:bodyPr rtlCol="0" anchor="ctr"/>
-          <a:lstStyle/>
-          <a:p>
-            <a:pPr algn="ctr"/>
-            <a:endParaRPr lang="en-US"/>
-          </a:p>
-        </p:txBody>
-      </p:sp>
-      <p:sp>
-        <p:nvSpPr>
-          <p:cNvPr id="10" name="Rectangle 9">
-            <a:extLst>
-              <a:ext uri="{FF2B5EF4-FFF2-40B4-BE49-F238E27FC236}">
-                <a16:creationId xmlns:a16="http://schemas.microsoft.com/office/drawing/2014/main" id="{3B2E3793-BFE6-45A2-9B7B-E18844431C99}"/>
-              </a:ext>
-              <a:ext uri="{C183D7F6-B498-43B3-948B-1728B52AA6E4}">
-                <adec:decorative xmlns:adec="http://schemas.microsoft.com/office/drawing/2017/decorative" val="1"/>
-              </a:ext>
-            </a:extLst>
-          </p:cNvPr>
-          <p:cNvSpPr>
-            <a:spLocks noGrp="1" noRot="1" noChangeAspect="1" noMove="1" noResize="1" noEditPoints="1" noAdjustHandles="1" noChangeArrowheads="1" noChangeShapeType="1" noTextEdit="1"/>
-          </p:cNvSpPr>
-          <p:nvPr>
-            <p:extLst>
-              <p:ext uri="{386F3935-93C4-4BCD-93E2-E3B085C9AB24}">
-                <p16:designElem xmlns:p16="http://schemas.microsoft.com/office/powerpoint/2015/main" val="1"/>
-              </p:ext>
-            </p:extLst>
-          </p:nvPr>
-        </p:nvSpPr>
-        <p:spPr>
-          <a:xfrm flipH="1">
-            <a:off x="-1" y="-1"/>
-            <a:ext cx="12191998" cy="1590742"/>
-          </a:xfrm>
-          <a:prstGeom prst="rect">
-            <a:avLst/>
-          </a:prstGeom>
-          <a:gradFill>
-            <a:gsLst>
-              <a:gs pos="0">
-                <a:srgbClr val="000000"/>
-              </a:gs>
-              <a:gs pos="100000">
-                <a:schemeClr val="accent1">
-                  <a:lumMod val="75000"/>
-                </a:schemeClr>
-              </a:gs>
-            </a:gsLst>
-            <a:lin ang="8400000" scaled="0"/>
-          </a:gradFill>
-          <a:ln>
-            <a:noFill/>
-          </a:ln>
-        </p:spPr>
-        <p:style>
-          <a:lnRef idx="2">
-            <a:schemeClr val="accent1">
-              <a:shade val="50000"/>
-            </a:schemeClr>
-          </a:lnRef>
-          <a:fillRef idx="1">
-            <a:schemeClr val="accent1"/>
-          </a:fillRef>
-          <a:effectRef idx="0">
-            <a:schemeClr val="accent1"/>
-          </a:effectRef>
-          <a:fontRef idx="minor">
-            <a:schemeClr val="lt1"/>
-          </a:fontRef>
-        </p:style>
-        <p:txBody>
-          <a:bodyPr rtlCol="0" anchor="ctr"/>
-          <a:lstStyle/>
-          <a:p>
-            <a:pPr algn="ctr"/>
-            <a:endParaRPr lang="en-US"/>
-          </a:p>
-        </p:txBody>
-      </p:sp>
-      <p:sp>
-        <p:nvSpPr>
-          <p:cNvPr id="12" name="Rectangle 11">
-            <a:extLst>
-              <a:ext uri="{FF2B5EF4-FFF2-40B4-BE49-F238E27FC236}">
-                <a16:creationId xmlns:a16="http://schemas.microsoft.com/office/drawing/2014/main" id="{BC4C4868-CB8F-4AF9-9CDB-8108F2C19B67}"/>
-              </a:ext>
-              <a:ext uri="{C183D7F6-B498-43B3-948B-1728B52AA6E4}">
-                <adec:decorative xmlns:adec="http://schemas.microsoft.com/office/drawing/2017/decorative" val="1"/>
-              </a:ext>
-            </a:extLst>
-          </p:cNvPr>
-          <p:cNvSpPr>
-            <a:spLocks noGrp="1" noRot="1" noChangeAspect="1" noMove="1" noResize="1" noEditPoints="1" noAdjustHandles="1" noChangeArrowheads="1" noChangeShapeType="1" noTextEdit="1"/>
-          </p:cNvSpPr>
-          <p:nvPr>
-            <p:extLst>
-              <p:ext uri="{386F3935-93C4-4BCD-93E2-E3B085C9AB24}">
-                <p16:designElem xmlns:p16="http://schemas.microsoft.com/office/powerpoint/2015/main" val="1"/>
-              </p:ext>
-            </p:extLst>
-          </p:nvPr>
-        </p:nvSpPr>
-        <p:spPr>
-          <a:xfrm rot="10800000" flipH="1">
-            <a:off x="-3" y="0"/>
-            <a:ext cx="8115306" cy="1590742"/>
-          </a:xfrm>
-          <a:prstGeom prst="rect">
-            <a:avLst/>
-          </a:prstGeom>
-          <a:gradFill>
-            <a:gsLst>
-              <a:gs pos="20000">
-                <a:schemeClr val="accent1">
-                  <a:alpha val="0"/>
-                </a:schemeClr>
-              </a:gs>
-              <a:gs pos="100000">
-                <a:schemeClr val="accent1">
-                  <a:lumMod val="50000"/>
-                  <a:alpha val="55000"/>
-                </a:schemeClr>
-              </a:gs>
-            </a:gsLst>
-            <a:lin ang="13800000" scaled="0"/>
-          </a:gradFill>
-          <a:ln>
-            <a:noFill/>
-          </a:ln>
-        </p:spPr>
-        <p:style>
-          <a:lnRef idx="2">
-            <a:schemeClr val="accent1">
-              <a:shade val="50000"/>
-            </a:schemeClr>
-          </a:lnRef>
-          <a:fillRef idx="1">
-            <a:schemeClr val="accent1"/>
-          </a:fillRef>
-          <a:effectRef idx="0">
-            <a:schemeClr val="accent1"/>
-          </a:effectRef>
-          <a:fontRef idx="minor">
-            <a:schemeClr val="lt1"/>
-          </a:fontRef>
-        </p:style>
-        <p:txBody>
-          <a:bodyPr rtlCol="0" anchor="ctr"/>
-          <a:lstStyle/>
-          <a:p>
-            <a:pPr algn="ctr"/>
-            <a:endParaRPr lang="en-US"/>
-          </a:p>
-        </p:txBody>
-      </p:sp>
-      <p:sp>
-        <p:nvSpPr>
-          <p:cNvPr id="14" name="Rectangle 13">
-            <a:extLst>
-              <a:ext uri="{FF2B5EF4-FFF2-40B4-BE49-F238E27FC236}">
-                <a16:creationId xmlns:a16="http://schemas.microsoft.com/office/drawing/2014/main" id="{375E0459-6403-40CD-989D-56A4407CA12E}"/>
-              </a:ext>
-              <a:ext uri="{C183D7F6-B498-43B3-948B-1728B52AA6E4}">
-                <adec:decorative xmlns:adec="http://schemas.microsoft.com/office/drawing/2017/decorative" val="1"/>
-              </a:ext>
-            </a:extLst>
-          </p:cNvPr>
-          <p:cNvSpPr>
-            <a:spLocks noGrp="1" noRot="1" noChangeAspect="1" noMove="1" noResize="1" noEditPoints="1" noAdjustHandles="1" noChangeArrowheads="1" noChangeShapeType="1" noTextEdit="1"/>
-          </p:cNvSpPr>
-          <p:nvPr>
-            <p:extLst>
-              <p:ext uri="{386F3935-93C4-4BCD-93E2-E3B085C9AB24}">
-                <p16:designElem xmlns:p16="http://schemas.microsoft.com/office/powerpoint/2015/main" val="1"/>
-              </p:ext>
-            </p:extLst>
-          </p:nvPr>
-        </p:nvSpPr>
-        <p:spPr>
-          <a:xfrm flipH="1">
-            <a:off x="8115299" y="-1"/>
-            <a:ext cx="4076698" cy="1590742"/>
-          </a:xfrm>
-          <a:prstGeom prst="rect">
-            <a:avLst/>
-          </a:prstGeom>
-          <a:gradFill>
-            <a:gsLst>
-              <a:gs pos="0">
-                <a:schemeClr val="accent1">
-                  <a:alpha val="66000"/>
-                </a:schemeClr>
-              </a:gs>
-              <a:gs pos="100000">
-                <a:srgbClr val="000000">
-                  <a:alpha val="30000"/>
-                </a:srgbClr>
-              </a:gs>
-            </a:gsLst>
-            <a:lin ang="13200000" scaled="0"/>
-          </a:gradFill>
-          <a:ln>
-            <a:noFill/>
-          </a:ln>
-        </p:spPr>
-        <p:style>
-          <a:lnRef idx="2">
-            <a:schemeClr val="accent1">
-              <a:shade val="50000"/>
-            </a:schemeClr>
-          </a:lnRef>
-          <a:fillRef idx="1">
-            <a:schemeClr val="accent1"/>
-          </a:fillRef>
-          <a:effectRef idx="0">
-            <a:schemeClr val="accent1"/>
-          </a:effectRef>
-          <a:fontRef idx="minor">
-            <a:schemeClr val="lt1"/>
-          </a:fontRef>
-        </p:style>
-        <p:txBody>
-          <a:bodyPr rtlCol="0" anchor="ctr"/>
-          <a:lstStyle/>
-          <a:p>
-            <a:pPr algn="ctr"/>
-            <a:endParaRPr lang="en-US"/>
-          </a:p>
-        </p:txBody>
-      </p:sp>
-      <p:sp>
-        <p:nvSpPr>
-          <p:cNvPr id="16" name="Rectangle 15">
-            <a:extLst>
-              <a:ext uri="{FF2B5EF4-FFF2-40B4-BE49-F238E27FC236}">
-                <a16:creationId xmlns:a16="http://schemas.microsoft.com/office/drawing/2014/main" id="{53E5B1A8-3AC9-4BD1-9BBC-78CA94F2D1BA}"/>
-              </a:ext>
-              <a:ext uri="{C183D7F6-B498-43B3-948B-1728B52AA6E4}">
-                <adec:decorative xmlns:adec="http://schemas.microsoft.com/office/drawing/2017/decorative" val="1"/>
-              </a:ext>
-            </a:extLst>
-          </p:cNvPr>
-          <p:cNvSpPr>
-            <a:spLocks noGrp="1" noRot="1" noChangeAspect="1" noMove="1" noResize="1" noEditPoints="1" noAdjustHandles="1" noChangeArrowheads="1" noChangeShapeType="1" noTextEdit="1"/>
-          </p:cNvSpPr>
-          <p:nvPr>
-            <p:extLst>
-              <p:ext uri="{386F3935-93C4-4BCD-93E2-E3B085C9AB24}">
-                <p16:designElem xmlns:p16="http://schemas.microsoft.com/office/powerpoint/2015/main" val="1"/>
-              </p:ext>
-            </p:extLst>
-          </p:nvPr>
-        </p:nvSpPr>
-        <p:spPr>
-          <a:xfrm>
-            <a:off x="459350" y="-1"/>
-            <a:ext cx="11732646" cy="1597433"/>
-          </a:xfrm>
-          <a:prstGeom prst="rect">
-            <a:avLst/>
-          </a:prstGeom>
-          <a:gradFill>
-            <a:gsLst>
-              <a:gs pos="50000">
-                <a:srgbClr val="000000">
-                  <a:alpha val="0"/>
-                </a:srgbClr>
-              </a:gs>
-              <a:gs pos="99000">
-                <a:schemeClr val="accent1">
-                  <a:lumMod val="50000"/>
-                  <a:alpha val="52000"/>
-                </a:schemeClr>
-              </a:gs>
-            </a:gsLst>
-            <a:lin ang="16800000" scaled="0"/>
-          </a:gradFill>
-          <a:ln>
-            <a:noFill/>
-          </a:ln>
-        </p:spPr>
-        <p:style>
-          <a:lnRef idx="2">
-            <a:schemeClr val="accent1">
-              <a:shade val="50000"/>
-            </a:schemeClr>
-          </a:lnRef>
-          <a:fillRef idx="1">
-            <a:schemeClr val="accent1"/>
-          </a:fillRef>
-          <a:effectRef idx="0">
-            <a:schemeClr val="accent1"/>
-          </a:effectRef>
-          <a:fontRef idx="minor">
-            <a:schemeClr val="lt1"/>
-          </a:fontRef>
-        </p:style>
-        <p:txBody>
-          <a:bodyPr rtlCol="0" anchor="ctr"/>
-          <a:lstStyle/>
-          <a:p>
-            <a:pPr algn="ctr"/>
-            <a:endParaRPr lang="en-US"/>
-          </a:p>
-        </p:txBody>
-      </p:sp>
-      <p:sp>
-        <p:nvSpPr>
-          <p:cNvPr id="2" name="Titel 1">
-            <a:extLst>
-              <a:ext uri="{FF2B5EF4-FFF2-40B4-BE49-F238E27FC236}">
-                <a16:creationId xmlns:a16="http://schemas.microsoft.com/office/drawing/2014/main" id="{0E50BAD0-0946-44F5-BA6B-73A80B6BD197}"/>
-              </a:ext>
-            </a:extLst>
-          </p:cNvPr>
-          <p:cNvSpPr>
-            <a:spLocks noGrp="1"/>
-          </p:cNvSpPr>
-          <p:nvPr>
-            <p:ph type="title"/>
-          </p:nvPr>
-        </p:nvSpPr>
-        <p:spPr>
-          <a:xfrm>
-            <a:off x="1371599" y="294538"/>
-            <a:ext cx="9895951" cy="1033669"/>
-          </a:xfrm>
-        </p:spPr>
-        <p:txBody>
-          <a:bodyPr>
-            <a:normAutofit/>
-          </a:bodyPr>
-          <a:lstStyle/>
-          <a:p>
-            <a:r>
-              <a:rPr lang="de-DE" sz="4000">
-                <a:solidFill>
-                  <a:srgbClr val="FFFFFF"/>
-                </a:solidFill>
-              </a:rPr>
-              <a:t>Demo</a:t>
-            </a:r>
-            <a:endParaRPr lang="de-CH" sz="4000">
-              <a:solidFill>
-                <a:srgbClr val="FFFFFF"/>
-              </a:solidFill>
-            </a:endParaRPr>
-          </a:p>
-        </p:txBody>
-      </p:sp>
-      <p:sp>
-        <p:nvSpPr>
-          <p:cNvPr id="3" name="Inhaltsplatzhalter 2">
-            <a:extLst>
-              <a:ext uri="{FF2B5EF4-FFF2-40B4-BE49-F238E27FC236}">
-                <a16:creationId xmlns:a16="http://schemas.microsoft.com/office/drawing/2014/main" id="{41EB93CA-AA51-4471-8507-60BE82124DD7}"/>
-              </a:ext>
-            </a:extLst>
-          </p:cNvPr>
-          <p:cNvSpPr>
-            <a:spLocks noGrp="1"/>
-          </p:cNvSpPr>
-          <p:nvPr>
-            <p:ph idx="1"/>
-          </p:nvPr>
-        </p:nvSpPr>
-        <p:spPr>
-          <a:xfrm>
-            <a:off x="1371599" y="2318197"/>
-            <a:ext cx="9724031" cy="3683358"/>
-          </a:xfrm>
-        </p:spPr>
-        <p:txBody>
-          <a:bodyPr anchor="ctr">
-            <a:normAutofit/>
-          </a:bodyPr>
-          <a:lstStyle/>
-          <a:p>
-            <a:endParaRPr lang="de-CH" sz="2000"/>
           </a:p>
         </p:txBody>
       </p:sp>
@@ -8735,16 +7688,302 @@
 </a:theme>
 </file>
 
-<file path=customXml/item1.xml><?xml version="1.0" encoding="utf-8"?>
-<?mso-contentType ?>
-<FormTemplates xmlns="http://schemas.microsoft.com/sharepoint/v3/contenttype/forms">
-  <Display>DocumentLibraryForm</Display>
-  <Edit>DocumentLibraryForm</Edit>
-  <New>DocumentLibraryForm</New>
-</FormTemplates>
+<file path=ppt/theme/theme2.xml><?xml version="1.0" encoding="utf-8"?>
+<a:theme xmlns:a="http://schemas.openxmlformats.org/drawingml/2006/main" name="Office">
+  <a:themeElements>
+    <a:clrScheme name="Office">
+      <a:dk1>
+        <a:sysClr val="windowText" lastClr="000000"/>
+      </a:dk1>
+      <a:lt1>
+        <a:sysClr val="window" lastClr="FFFFFF"/>
+      </a:lt1>
+      <a:dk2>
+        <a:srgbClr val="44546A"/>
+      </a:dk2>
+      <a:lt2>
+        <a:srgbClr val="E7E6E6"/>
+      </a:lt2>
+      <a:accent1>
+        <a:srgbClr val="4472C4"/>
+      </a:accent1>
+      <a:accent2>
+        <a:srgbClr val="ED7D31"/>
+      </a:accent2>
+      <a:accent3>
+        <a:srgbClr val="A5A5A5"/>
+      </a:accent3>
+      <a:accent4>
+        <a:srgbClr val="FFC000"/>
+      </a:accent4>
+      <a:accent5>
+        <a:srgbClr val="5B9BD5"/>
+      </a:accent5>
+      <a:accent6>
+        <a:srgbClr val="70AD47"/>
+      </a:accent6>
+      <a:hlink>
+        <a:srgbClr val="0563C1"/>
+      </a:hlink>
+      <a:folHlink>
+        <a:srgbClr val="954F72"/>
+      </a:folHlink>
+    </a:clrScheme>
+    <a:fontScheme name="Office">
+      <a:majorFont>
+        <a:latin typeface="Calibri Light" panose="020F0302020204030204"/>
+        <a:ea typeface=""/>
+        <a:cs typeface=""/>
+        <a:font script="Jpan" typeface="游ゴシック Light"/>
+        <a:font script="Hang" typeface="맑은 고딕"/>
+        <a:font script="Hans" typeface="等线 Light"/>
+        <a:font script="Hant" typeface="新細明體"/>
+        <a:font script="Arab" typeface="Times New Roman"/>
+        <a:font script="Hebr" typeface="Times New Roman"/>
+        <a:font script="Thai" typeface="Angsana New"/>
+        <a:font script="Ethi" typeface="Nyala"/>
+        <a:font script="Beng" typeface="Vrinda"/>
+        <a:font script="Gujr" typeface="Shruti"/>
+        <a:font script="Khmr" typeface="MoolBoran"/>
+        <a:font script="Knda" typeface="Tunga"/>
+        <a:font script="Guru" typeface="Raavi"/>
+        <a:font script="Cans" typeface="Euphemia"/>
+        <a:font script="Cher" typeface="Plantagenet Cherokee"/>
+        <a:font script="Yiii" typeface="Microsoft Yi Baiti"/>
+        <a:font script="Tibt" typeface="Microsoft Himalaya"/>
+        <a:font script="Thaa" typeface="MV Boli"/>
+        <a:font script="Deva" typeface="Mangal"/>
+        <a:font script="Telu" typeface="Gautami"/>
+        <a:font script="Taml" typeface="Latha"/>
+        <a:font script="Syrc" typeface="Estrangelo Edessa"/>
+        <a:font script="Orya" typeface="Kalinga"/>
+        <a:font script="Mlym" typeface="Kartika"/>
+        <a:font script="Laoo" typeface="DokChampa"/>
+        <a:font script="Sinh" typeface="Iskoola Pota"/>
+        <a:font script="Mong" typeface="Mongolian Baiti"/>
+        <a:font script="Viet" typeface="Times New Roman"/>
+        <a:font script="Uigh" typeface="Microsoft Uighur"/>
+        <a:font script="Geor" typeface="Sylfaen"/>
+        <a:font script="Armn" typeface="Arial"/>
+        <a:font script="Bugi" typeface="Leelawadee UI"/>
+        <a:font script="Bopo" typeface="Microsoft JhengHei"/>
+        <a:font script="Java" typeface="Javanese Text"/>
+        <a:font script="Lisu" typeface="Segoe UI"/>
+        <a:font script="Mymr" typeface="Myanmar Text"/>
+        <a:font script="Nkoo" typeface="Ebrima"/>
+        <a:font script="Olck" typeface="Nirmala UI"/>
+        <a:font script="Osma" typeface="Ebrima"/>
+        <a:font script="Phag" typeface="Phagspa"/>
+        <a:font script="Syrn" typeface="Estrangelo Edessa"/>
+        <a:font script="Syrj" typeface="Estrangelo Edessa"/>
+        <a:font script="Syre" typeface="Estrangelo Edessa"/>
+        <a:font script="Sora" typeface="Nirmala UI"/>
+        <a:font script="Tale" typeface="Microsoft Tai Le"/>
+        <a:font script="Talu" typeface="Microsoft New Tai Lue"/>
+        <a:font script="Tfng" typeface="Ebrima"/>
+      </a:majorFont>
+      <a:minorFont>
+        <a:latin typeface="Calibri" panose="020F0502020204030204"/>
+        <a:ea typeface=""/>
+        <a:cs typeface=""/>
+        <a:font script="Jpan" typeface="游ゴシック"/>
+        <a:font script="Hang" typeface="맑은 고딕"/>
+        <a:font script="Hans" typeface="等线"/>
+        <a:font script="Hant" typeface="新細明體"/>
+        <a:font script="Arab" typeface="Arial"/>
+        <a:font script="Hebr" typeface="Arial"/>
+        <a:font script="Thai" typeface="Cordia New"/>
+        <a:font script="Ethi" typeface="Nyala"/>
+        <a:font script="Beng" typeface="Vrinda"/>
+        <a:font script="Gujr" typeface="Shruti"/>
+        <a:font script="Khmr" typeface="DaunPenh"/>
+        <a:font script="Knda" typeface="Tunga"/>
+        <a:font script="Guru" typeface="Raavi"/>
+        <a:font script="Cans" typeface="Euphemia"/>
+        <a:font script="Cher" typeface="Plantagenet Cherokee"/>
+        <a:font script="Yiii" typeface="Microsoft Yi Baiti"/>
+        <a:font script="Tibt" typeface="Microsoft Himalaya"/>
+        <a:font script="Thaa" typeface="MV Boli"/>
+        <a:font script="Deva" typeface="Mangal"/>
+        <a:font script="Telu" typeface="Gautami"/>
+        <a:font script="Taml" typeface="Latha"/>
+        <a:font script="Syrc" typeface="Estrangelo Edessa"/>
+        <a:font script="Orya" typeface="Kalinga"/>
+        <a:font script="Mlym" typeface="Kartika"/>
+        <a:font script="Laoo" typeface="DokChampa"/>
+        <a:font script="Sinh" typeface="Iskoola Pota"/>
+        <a:font script="Mong" typeface="Mongolian Baiti"/>
+        <a:font script="Viet" typeface="Arial"/>
+        <a:font script="Uigh" typeface="Microsoft Uighur"/>
+        <a:font script="Geor" typeface="Sylfaen"/>
+        <a:font script="Armn" typeface="Arial"/>
+        <a:font script="Bugi" typeface="Leelawadee UI"/>
+        <a:font script="Bopo" typeface="Microsoft JhengHei"/>
+        <a:font script="Java" typeface="Javanese Text"/>
+        <a:font script="Lisu" typeface="Segoe UI"/>
+        <a:font script="Mymr" typeface="Myanmar Text"/>
+        <a:font script="Nkoo" typeface="Ebrima"/>
+        <a:font script="Olck" typeface="Nirmala UI"/>
+        <a:font script="Osma" typeface="Ebrima"/>
+        <a:font script="Phag" typeface="Phagspa"/>
+        <a:font script="Syrn" typeface="Estrangelo Edessa"/>
+        <a:font script="Syrj" typeface="Estrangelo Edessa"/>
+        <a:font script="Syre" typeface="Estrangelo Edessa"/>
+        <a:font script="Sora" typeface="Nirmala UI"/>
+        <a:font script="Tale" typeface="Microsoft Tai Le"/>
+        <a:font script="Talu" typeface="Microsoft New Tai Lue"/>
+        <a:font script="Tfng" typeface="Ebrima"/>
+      </a:minorFont>
+    </a:fontScheme>
+    <a:fmtScheme name="Office">
+      <a:fillStyleLst>
+        <a:solidFill>
+          <a:schemeClr val="phClr"/>
+        </a:solidFill>
+        <a:gradFill rotWithShape="1">
+          <a:gsLst>
+            <a:gs pos="0">
+              <a:schemeClr val="phClr">
+                <a:lumMod val="110000"/>
+                <a:satMod val="105000"/>
+                <a:tint val="67000"/>
+              </a:schemeClr>
+            </a:gs>
+            <a:gs pos="50000">
+              <a:schemeClr val="phClr">
+                <a:lumMod val="105000"/>
+                <a:satMod val="103000"/>
+                <a:tint val="73000"/>
+              </a:schemeClr>
+            </a:gs>
+            <a:gs pos="100000">
+              <a:schemeClr val="phClr">
+                <a:lumMod val="105000"/>
+                <a:satMod val="109000"/>
+                <a:tint val="81000"/>
+              </a:schemeClr>
+            </a:gs>
+          </a:gsLst>
+          <a:lin ang="5400000" scaled="0"/>
+        </a:gradFill>
+        <a:gradFill rotWithShape="1">
+          <a:gsLst>
+            <a:gs pos="0">
+              <a:schemeClr val="phClr">
+                <a:satMod val="103000"/>
+                <a:lumMod val="102000"/>
+                <a:tint val="94000"/>
+              </a:schemeClr>
+            </a:gs>
+            <a:gs pos="50000">
+              <a:schemeClr val="phClr">
+                <a:satMod val="110000"/>
+                <a:lumMod val="100000"/>
+                <a:shade val="100000"/>
+              </a:schemeClr>
+            </a:gs>
+            <a:gs pos="100000">
+              <a:schemeClr val="phClr">
+                <a:lumMod val="99000"/>
+                <a:satMod val="120000"/>
+                <a:shade val="78000"/>
+              </a:schemeClr>
+            </a:gs>
+          </a:gsLst>
+          <a:lin ang="5400000" scaled="0"/>
+        </a:gradFill>
+      </a:fillStyleLst>
+      <a:lnStyleLst>
+        <a:ln w="6350" cap="flat" cmpd="sng" algn="ctr">
+          <a:solidFill>
+            <a:schemeClr val="phClr"/>
+          </a:solidFill>
+          <a:prstDash val="solid"/>
+          <a:miter lim="800000"/>
+        </a:ln>
+        <a:ln w="12700" cap="flat" cmpd="sng" algn="ctr">
+          <a:solidFill>
+            <a:schemeClr val="phClr"/>
+          </a:solidFill>
+          <a:prstDash val="solid"/>
+          <a:miter lim="800000"/>
+        </a:ln>
+        <a:ln w="19050" cap="flat" cmpd="sng" algn="ctr">
+          <a:solidFill>
+            <a:schemeClr val="phClr"/>
+          </a:solidFill>
+          <a:prstDash val="solid"/>
+          <a:miter lim="800000"/>
+        </a:ln>
+      </a:lnStyleLst>
+      <a:effectStyleLst>
+        <a:effectStyle>
+          <a:effectLst/>
+        </a:effectStyle>
+        <a:effectStyle>
+          <a:effectLst/>
+        </a:effectStyle>
+        <a:effectStyle>
+          <a:effectLst>
+            <a:outerShdw blurRad="57150" dist="19050" dir="5400000" algn="ctr" rotWithShape="0">
+              <a:srgbClr val="000000">
+                <a:alpha val="63000"/>
+              </a:srgbClr>
+            </a:outerShdw>
+          </a:effectLst>
+        </a:effectStyle>
+      </a:effectStyleLst>
+      <a:bgFillStyleLst>
+        <a:solidFill>
+          <a:schemeClr val="phClr"/>
+        </a:solidFill>
+        <a:solidFill>
+          <a:schemeClr val="phClr">
+            <a:tint val="95000"/>
+            <a:satMod val="170000"/>
+          </a:schemeClr>
+        </a:solidFill>
+        <a:gradFill rotWithShape="1">
+          <a:gsLst>
+            <a:gs pos="0">
+              <a:schemeClr val="phClr">
+                <a:tint val="93000"/>
+                <a:satMod val="150000"/>
+                <a:shade val="98000"/>
+                <a:lumMod val="102000"/>
+              </a:schemeClr>
+            </a:gs>
+            <a:gs pos="50000">
+              <a:schemeClr val="phClr">
+                <a:tint val="98000"/>
+                <a:satMod val="130000"/>
+                <a:shade val="90000"/>
+                <a:lumMod val="103000"/>
+              </a:schemeClr>
+            </a:gs>
+            <a:gs pos="100000">
+              <a:schemeClr val="phClr">
+                <a:shade val="63000"/>
+                <a:satMod val="120000"/>
+              </a:schemeClr>
+            </a:gs>
+          </a:gsLst>
+          <a:lin ang="5400000" scaled="0"/>
+        </a:gradFill>
+      </a:bgFillStyleLst>
+    </a:fmtScheme>
+  </a:themeElements>
+  <a:objectDefaults/>
+  <a:extraClrSchemeLst/>
+  <a:extLst>
+    <a:ext uri="{05A4C25C-085E-4340-85A3-A5531E510DB2}">
+      <thm15:themeFamily xmlns:thm15="http://schemas.microsoft.com/office/thememl/2012/main" name="Office Theme" id="{62F939B6-93AF-4DB8-9C6B-D6C7DFDC589F}" vid="{4A3C46E8-61CC-4603-A589-7422A47A8E4A}"/>
+    </a:ext>
+  </a:extLst>
+</a:theme>
 </file>
 
-<file path=customXml/item2.xml><?xml version="1.0" encoding="utf-8"?>
+<file path=customXml/item1.xml><?xml version="1.0" encoding="utf-8"?>
 <ct:contentTypeSchema xmlns:ct="http://schemas.microsoft.com/office/2006/metadata/contentType" xmlns:ma="http://schemas.microsoft.com/office/2006/metadata/properties/metaAttributes" ct:_="" ma:_="" ma:contentTypeName="Document" ma:contentTypeID="0x0101006779A18CFABD6B4586FA6801447DB525" ma:contentTypeVersion="0" ma:contentTypeDescription="Create a new document." ma:contentTypeScope="" ma:versionID="eb2b0728f0e5fa2bf1c8260aad850eb2">
   <xsd:schema xmlns:xsd="http://www.w3.org/2001/XMLSchema" xmlns:xs="http://www.w3.org/2001/XMLSchema" xmlns:p="http://schemas.microsoft.com/office/2006/metadata/properties" targetNamespace="http://schemas.microsoft.com/office/2006/metadata/properties" ma:root="true" ma:fieldsID="fb29bce60f4b2d1143f0f99b96ef3205">
     <xsd:element name="properties">
@@ -8858,21 +8097,22 @@
 </ct:contentTypeSchema>
 </file>
 
-<file path=customXml/item3.xml><?xml version="1.0" encoding="utf-8"?>
+<file path=customXml/item2.xml><?xml version="1.0" encoding="utf-8"?>
 <p:properties xmlns:p="http://schemas.microsoft.com/office/2006/metadata/properties" xmlns:xsi="http://www.w3.org/2001/XMLSchema-instance" xmlns:pc="http://schemas.microsoft.com/office/infopath/2007/PartnerControls">
   <documentManagement/>
 </p:properties>
 </file>
 
-<file path=customXml/itemProps1.xml><?xml version="1.0" encoding="utf-8"?>
-<ds:datastoreItem xmlns:ds="http://schemas.openxmlformats.org/officeDocument/2006/customXml" ds:itemID="{69DAB162-FD7D-4A69-9070-166BB7DDEFAF}">
-  <ds:schemaRefs>
-    <ds:schemaRef ds:uri="http://schemas.microsoft.com/sharepoint/v3/contenttype/forms"/>
-  </ds:schemaRefs>
-</ds:datastoreItem>
+<file path=customXml/item3.xml><?xml version="1.0" encoding="utf-8"?>
+<?mso-contentType ?>
+<FormTemplates xmlns="http://schemas.microsoft.com/sharepoint/v3/contenttype/forms">
+  <Display>DocumentLibraryForm</Display>
+  <Edit>DocumentLibraryForm</Edit>
+  <New>DocumentLibraryForm</New>
+</FormTemplates>
 </file>
 
-<file path=customXml/itemProps2.xml><?xml version="1.0" encoding="utf-8"?>
+<file path=customXml/itemProps1.xml><?xml version="1.0" encoding="utf-8"?>
 <ds:datastoreItem xmlns:ds="http://schemas.openxmlformats.org/officeDocument/2006/customXml" ds:itemID="{3D24673B-3D6E-4160-871C-0671DA527CA4}">
   <ds:schemaRefs>
     <ds:schemaRef ds:uri="http://purl.org/dc/elements/1.1/"/>
@@ -8888,7 +8128,7 @@
 </ds:datastoreItem>
 </file>
 
-<file path=customXml/itemProps3.xml><?xml version="1.0" encoding="utf-8"?>
+<file path=customXml/itemProps2.xml><?xml version="1.0" encoding="utf-8"?>
 <ds:datastoreItem xmlns:ds="http://schemas.openxmlformats.org/officeDocument/2006/customXml" ds:itemID="{174B6173-8628-4AB8-A901-294ECB31CD1C}">
   <ds:schemaRefs>
     <ds:schemaRef ds:uri="http://purl.org/dc/dcmitype/"/>
@@ -8901,4 +8141,12 @@
     <ds:schemaRef ds:uri="http://www.w3.org/XML/1998/namespace"/>
   </ds:schemaRefs>
 </ds:datastoreItem>
+</file>
+
+<file path=customXml/itemProps3.xml><?xml version="1.0" encoding="utf-8"?>
+<ds:datastoreItem xmlns:ds="http://schemas.openxmlformats.org/officeDocument/2006/customXml" ds:itemID="{69DAB162-FD7D-4A69-9070-166BB7DDEFAF}">
+  <ds:schemaRefs>
+    <ds:schemaRef ds:uri="http://schemas.microsoft.com/sharepoint/v3/contenttype/forms"/>
+  </ds:schemaRefs>
+</ds:datastoreItem>
 </file>
</xml_diff>